<commit_message>
update deck for session 2
</commit_message>
<xml_diff>
--- a/doc/git_demo.pptx
+++ b/doc/git_demo.pptx
@@ -1,6 +1,6 @@
 
 <file path=ppt/presentation.xml><?xml version="1.0" encoding="utf-8"?>
-<p:presentation xmlns:a="http://schemas.openxmlformats.org/drawingml/2006/main" xmlns:r="http://schemas.openxmlformats.org/officeDocument/2006/relationships" xmlns:mc="http://schemas.openxmlformats.org/markup-compatibility/2006" xmlns:mv="urn:schemas-microsoft-com:mac:vml" xmlns:p="http://schemas.openxmlformats.org/presentationml/2006/main" xmlns:c="http://schemas.openxmlformats.org/drawingml/2006/chart" xmlns:dgm="http://schemas.openxmlformats.org/drawingml/2006/diagram" xmlns:o="urn:schemas-microsoft-com:office:office" xmlns:v="urn:schemas-microsoft-com:vml" xmlns:pvml="urn:schemas-microsoft-com:office:powerpoint" xmlns:com="http://schemas.openxmlformats.org/drawingml/2006/compatibility" xmlns:p14="http://schemas.microsoft.com/office/powerpoint/2010/main" xmlns:p15="http://schemas.microsoft.com/office/powerpoint/2012/main" xmlns:ahyp="http://schemas.microsoft.com/office/drawing/2018/hyperlinkcolor" autoCompressPictures="0" strictFirstAndLastChars="0" saveSubsetFonts="1">
+<p:presentation xmlns:a="http://schemas.openxmlformats.org/drawingml/2006/main" xmlns:r="http://schemas.openxmlformats.org/officeDocument/2006/relationships" xmlns:mc="http://schemas.openxmlformats.org/markup-compatibility/2006" xmlns:mv="urn:schemas-microsoft-com:mac:vml" xmlns:p="http://schemas.openxmlformats.org/presentationml/2006/main" xmlns:c="http://schemas.openxmlformats.org/drawingml/2006/chart" xmlns:dgm="http://schemas.openxmlformats.org/drawingml/2006/diagram" xmlns:o="urn:schemas-microsoft-com:office:office" xmlns:v="urn:schemas-microsoft-com:vml" xmlns:pvml="urn:schemas-microsoft-com:office:powerpoint" xmlns:com="http://schemas.openxmlformats.org/drawingml/2006/compatibility" xmlns:p14="http://schemas.microsoft.com/office/powerpoint/2010/main" xmlns:p15="http://schemas.microsoft.com/office/powerpoint/2012/main" xmlns:ahyp="http://schemas.microsoft.com/office/drawing/2018/hyperlinkcolor" autoCompressPictures="0" embedTrueTypeFonts="1" strictFirstAndLastChars="0" saveSubsetFonts="1">
   <p:sldMasterIdLst>
     <p:sldMasterId id="2147483659" r:id="rId5"/>
   </p:sldMasterIdLst>
@@ -21,9 +21,30 @@
     <p:sldId id="266" r:id="rId17"/>
     <p:sldId id="267" r:id="rId18"/>
     <p:sldId id="268" r:id="rId19"/>
+    <p:sldId id="269" r:id="rId20"/>
+    <p:sldId id="270" r:id="rId21"/>
+    <p:sldId id="271" r:id="rId22"/>
+    <p:sldId id="272" r:id="rId23"/>
+    <p:sldId id="273" r:id="rId24"/>
   </p:sldIdLst>
   <p:sldSz cy="5143500" cx="9144000"/>
   <p:notesSz cx="6858000" cy="9144000"/>
+  <p:embeddedFontLst>
+    <p:embeddedFont>
+      <p:font typeface="Merriweather"/>
+      <p:regular r:id="rId25"/>
+      <p:bold r:id="rId26"/>
+      <p:italic r:id="rId27"/>
+      <p:boldItalic r:id="rId28"/>
+    </p:embeddedFont>
+    <p:embeddedFont>
+      <p:font typeface="Source Sans Pro"/>
+      <p:regular r:id="rId29"/>
+      <p:bold r:id="rId30"/>
+      <p:italic r:id="rId31"/>
+      <p:boldItalic r:id="rId32"/>
+    </p:embeddedFont>
+  </p:embeddedFontLst>
   <p:defaultTextStyle>
     <a:defPPr lvl="0" marR="0" rtl="0" algn="l">
       <a:lnSpc>
@@ -802,7 +823,7 @@
   <p:cSld>
     <p:spTree>
       <p:nvGrpSpPr>
-        <p:cNvPr id="103" name="Shape 103"/>
+        <p:cNvPr id="104" name="Shape 104"/>
         <p:cNvGrpSpPr/>
         <p:nvPr/>
       </p:nvGrpSpPr>
@@ -816,7 +837,7 @@
       </p:grpSpPr>
       <p:sp>
         <p:nvSpPr>
-          <p:cNvPr id="104" name="Google Shape;104;g1463889ffc7_0_12:notes"/>
+          <p:cNvPr id="105" name="Google Shape;105;g1463889ffc7_0_12:notes"/>
           <p:cNvSpPr/>
           <p:nvPr>
             <p:ph idx="2" type="sldImg"/>
@@ -851,7 +872,7 @@
       </p:sp>
       <p:sp>
         <p:nvSpPr>
-          <p:cNvPr id="105" name="Google Shape;105;g1463889ffc7_0_12:notes"/>
+          <p:cNvPr id="106" name="Google Shape;106;g1463889ffc7_0_12:notes"/>
           <p:cNvSpPr txBox="1"/>
           <p:nvPr>
             <p:ph idx="1" type="body"/>
@@ -901,7 +922,7 @@
   <p:cSld>
     <p:spTree>
       <p:nvGrpSpPr>
-        <p:cNvPr id="109" name="Shape 109"/>
+        <p:cNvPr id="110" name="Shape 110"/>
         <p:cNvGrpSpPr/>
         <p:nvPr/>
       </p:nvGrpSpPr>
@@ -915,7 +936,7 @@
       </p:grpSpPr>
       <p:sp>
         <p:nvSpPr>
-          <p:cNvPr id="110" name="Google Shape;110;g147169e43e7_0_74:notes"/>
+          <p:cNvPr id="111" name="Google Shape;111;g1494d7cf213_0_10:notes"/>
           <p:cNvSpPr/>
           <p:nvPr>
             <p:ph idx="2" type="sldImg"/>
@@ -950,7 +971,7 @@
       </p:sp>
       <p:sp>
         <p:nvSpPr>
-          <p:cNvPr id="111" name="Google Shape;111;g147169e43e7_0_74:notes"/>
+          <p:cNvPr id="112" name="Google Shape;112;g1494d7cf213_0_10:notes"/>
           <p:cNvSpPr txBox="1"/>
           <p:nvPr>
             <p:ph idx="1" type="body"/>
@@ -1014,7 +1035,7 @@
       </p:grpSpPr>
       <p:sp>
         <p:nvSpPr>
-          <p:cNvPr id="116" name="Google Shape;116;g147169e43e7_0_0:notes"/>
+          <p:cNvPr id="116" name="Google Shape;116;g1494d7cf213_0_0:notes"/>
           <p:cNvSpPr/>
           <p:nvPr>
             <p:ph idx="2" type="sldImg"/>
@@ -1049,7 +1070,7 @@
       </p:sp>
       <p:sp>
         <p:nvSpPr>
-          <p:cNvPr id="117" name="Google Shape;117;g147169e43e7_0_0:notes"/>
+          <p:cNvPr id="117" name="Google Shape;117;g1494d7cf213_0_0:notes"/>
           <p:cNvSpPr txBox="1"/>
           <p:nvPr>
             <p:ph idx="1" type="body"/>
@@ -1113,7 +1134,7 @@
       </p:grpSpPr>
       <p:sp>
         <p:nvSpPr>
-          <p:cNvPr id="122" name="Google Shape;122;g147169e43e7_0_5:notes"/>
+          <p:cNvPr id="122" name="Google Shape;122;g14994ee53c2_0_0:notes"/>
           <p:cNvSpPr/>
           <p:nvPr>
             <p:ph idx="2" type="sldImg"/>
@@ -1148,7 +1169,502 @@
       </p:sp>
       <p:sp>
         <p:nvSpPr>
-          <p:cNvPr id="123" name="Google Shape;123;g147169e43e7_0_5:notes"/>
+          <p:cNvPr id="123" name="Google Shape;123;g14994ee53c2_0_0:notes"/>
+          <p:cNvSpPr txBox="1"/>
+          <p:nvPr>
+            <p:ph idx="1" type="body"/>
+          </p:nvPr>
+        </p:nvSpPr>
+        <p:spPr>
+          <a:xfrm>
+            <a:off x="685800" y="4343400"/>
+            <a:ext cx="5486400" cy="4114800"/>
+          </a:xfrm>
+          <a:prstGeom prst="rect">
+            <a:avLst/>
+          </a:prstGeom>
+        </p:spPr>
+        <p:txBody>
+          <a:bodyPr anchorCtr="0" anchor="t" bIns="91425" lIns="91425" spcFirstLastPara="1" rIns="91425" wrap="square" tIns="91425">
+            <a:noAutofit/>
+          </a:bodyPr>
+          <a:lstStyle/>
+          <a:p>
+            <a:pPr indent="0" lvl="0" marL="0" rtl="0" algn="l">
+              <a:spcBef>
+                <a:spcPts val="0"/>
+              </a:spcBef>
+              <a:spcAft>
+                <a:spcPts val="0"/>
+              </a:spcAft>
+              <a:buNone/>
+            </a:pPr>
+            <a:r>
+              <a:t/>
+            </a:r>
+            <a:endParaRPr/>
+          </a:p>
+        </p:txBody>
+      </p:sp>
+    </p:spTree>
+  </p:cSld>
+  <p:clrMapOvr>
+    <a:masterClrMapping/>
+  </p:clrMapOvr>
+</p:notes>
+</file>
+
+<file path=ppt/notesSlides/notesSlide14.xml><?xml version="1.0" encoding="utf-8"?>
+<p:notes xmlns:a="http://schemas.openxmlformats.org/drawingml/2006/main" xmlns:r="http://schemas.openxmlformats.org/officeDocument/2006/relationships" xmlns:mc="http://schemas.openxmlformats.org/markup-compatibility/2006" xmlns:mv="urn:schemas-microsoft-com:mac:vml" xmlns:p="http://schemas.openxmlformats.org/presentationml/2006/main" xmlns:c="http://schemas.openxmlformats.org/drawingml/2006/chart" xmlns:dgm="http://schemas.openxmlformats.org/drawingml/2006/diagram" xmlns:o="urn:schemas-microsoft-com:office:office" xmlns:v="urn:schemas-microsoft-com:vml" xmlns:pvml="urn:schemas-microsoft-com:office:powerpoint" xmlns:com="http://schemas.openxmlformats.org/drawingml/2006/compatibility" xmlns:p14="http://schemas.microsoft.com/office/powerpoint/2010/main" xmlns:p15="http://schemas.microsoft.com/office/powerpoint/2012/main" xmlns:ahyp="http://schemas.microsoft.com/office/drawing/2018/hyperlinkcolor" showMasterPhAnim="0" showMasterSp="0">
+  <p:cSld>
+    <p:spTree>
+      <p:nvGrpSpPr>
+        <p:cNvPr id="127" name="Shape 127"/>
+        <p:cNvGrpSpPr/>
+        <p:nvPr/>
+      </p:nvGrpSpPr>
+      <p:grpSpPr>
+        <a:xfrm>
+          <a:off x="0" y="0"/>
+          <a:ext cx="0" cy="0"/>
+          <a:chOff x="0" y="0"/>
+          <a:chExt cx="0" cy="0"/>
+        </a:xfrm>
+      </p:grpSpPr>
+      <p:sp>
+        <p:nvSpPr>
+          <p:cNvPr id="128" name="Google Shape;128;g147169e43e7_0_74:notes"/>
+          <p:cNvSpPr/>
+          <p:nvPr>
+            <p:ph idx="2" type="sldImg"/>
+          </p:nvPr>
+        </p:nvSpPr>
+        <p:spPr>
+          <a:xfrm>
+            <a:off x="381300" y="685800"/>
+            <a:ext cx="6096000" cy="3429000"/>
+          </a:xfrm>
+          <a:custGeom>
+            <a:rect b="b" l="l" r="r" t="t"/>
+            <a:pathLst>
+              <a:path extrusionOk="0" h="120000" w="120000">
+                <a:moveTo>
+                  <a:pt x="0" y="0"/>
+                </a:moveTo>
+                <a:lnTo>
+                  <a:pt x="120000" y="0"/>
+                </a:lnTo>
+                <a:lnTo>
+                  <a:pt x="120000" y="120000"/>
+                </a:lnTo>
+                <a:lnTo>
+                  <a:pt x="0" y="120000"/>
+                </a:lnTo>
+                <a:close/>
+              </a:path>
+            </a:pathLst>
+          </a:custGeom>
+        </p:spPr>
+      </p:sp>
+      <p:sp>
+        <p:nvSpPr>
+          <p:cNvPr id="129" name="Google Shape;129;g147169e43e7_0_74:notes"/>
+          <p:cNvSpPr txBox="1"/>
+          <p:nvPr>
+            <p:ph idx="1" type="body"/>
+          </p:nvPr>
+        </p:nvSpPr>
+        <p:spPr>
+          <a:xfrm>
+            <a:off x="685800" y="4343400"/>
+            <a:ext cx="5486400" cy="4114800"/>
+          </a:xfrm>
+          <a:prstGeom prst="rect">
+            <a:avLst/>
+          </a:prstGeom>
+        </p:spPr>
+        <p:txBody>
+          <a:bodyPr anchorCtr="0" anchor="t" bIns="91425" lIns="91425" spcFirstLastPara="1" rIns="91425" wrap="square" tIns="91425">
+            <a:noAutofit/>
+          </a:bodyPr>
+          <a:lstStyle/>
+          <a:p>
+            <a:pPr indent="0" lvl="0" marL="0" rtl="0" algn="l">
+              <a:spcBef>
+                <a:spcPts val="0"/>
+              </a:spcBef>
+              <a:spcAft>
+                <a:spcPts val="0"/>
+              </a:spcAft>
+              <a:buNone/>
+            </a:pPr>
+            <a:r>
+              <a:t/>
+            </a:r>
+            <a:endParaRPr/>
+          </a:p>
+        </p:txBody>
+      </p:sp>
+    </p:spTree>
+  </p:cSld>
+  <p:clrMapOvr>
+    <a:masterClrMapping/>
+  </p:clrMapOvr>
+</p:notes>
+</file>
+
+<file path=ppt/notesSlides/notesSlide15.xml><?xml version="1.0" encoding="utf-8"?>
+<p:notes xmlns:a="http://schemas.openxmlformats.org/drawingml/2006/main" xmlns:r="http://schemas.openxmlformats.org/officeDocument/2006/relationships" xmlns:mc="http://schemas.openxmlformats.org/markup-compatibility/2006" xmlns:mv="urn:schemas-microsoft-com:mac:vml" xmlns:p="http://schemas.openxmlformats.org/presentationml/2006/main" xmlns:c="http://schemas.openxmlformats.org/drawingml/2006/chart" xmlns:dgm="http://schemas.openxmlformats.org/drawingml/2006/diagram" xmlns:o="urn:schemas-microsoft-com:office:office" xmlns:v="urn:schemas-microsoft-com:vml" xmlns:pvml="urn:schemas-microsoft-com:office:powerpoint" xmlns:com="http://schemas.openxmlformats.org/drawingml/2006/compatibility" xmlns:p14="http://schemas.microsoft.com/office/powerpoint/2010/main" xmlns:p15="http://schemas.microsoft.com/office/powerpoint/2012/main" xmlns:ahyp="http://schemas.microsoft.com/office/drawing/2018/hyperlinkcolor" showMasterPhAnim="0" showMasterSp="0">
+  <p:cSld>
+    <p:spTree>
+      <p:nvGrpSpPr>
+        <p:cNvPr id="133" name="Shape 133"/>
+        <p:cNvGrpSpPr/>
+        <p:nvPr/>
+      </p:nvGrpSpPr>
+      <p:grpSpPr>
+        <a:xfrm>
+          <a:off x="0" y="0"/>
+          <a:ext cx="0" cy="0"/>
+          <a:chOff x="0" y="0"/>
+          <a:chExt cx="0" cy="0"/>
+        </a:xfrm>
+      </p:grpSpPr>
+      <p:sp>
+        <p:nvSpPr>
+          <p:cNvPr id="134" name="Google Shape;134;g147169e43e7_0_0:notes"/>
+          <p:cNvSpPr/>
+          <p:nvPr>
+            <p:ph idx="2" type="sldImg"/>
+          </p:nvPr>
+        </p:nvSpPr>
+        <p:spPr>
+          <a:xfrm>
+            <a:off x="381300" y="685800"/>
+            <a:ext cx="6096000" cy="3429000"/>
+          </a:xfrm>
+          <a:custGeom>
+            <a:rect b="b" l="l" r="r" t="t"/>
+            <a:pathLst>
+              <a:path extrusionOk="0" h="120000" w="120000">
+                <a:moveTo>
+                  <a:pt x="0" y="0"/>
+                </a:moveTo>
+                <a:lnTo>
+                  <a:pt x="120000" y="0"/>
+                </a:lnTo>
+                <a:lnTo>
+                  <a:pt x="120000" y="120000"/>
+                </a:lnTo>
+                <a:lnTo>
+                  <a:pt x="0" y="120000"/>
+                </a:lnTo>
+                <a:close/>
+              </a:path>
+            </a:pathLst>
+          </a:custGeom>
+        </p:spPr>
+      </p:sp>
+      <p:sp>
+        <p:nvSpPr>
+          <p:cNvPr id="135" name="Google Shape;135;g147169e43e7_0_0:notes"/>
+          <p:cNvSpPr txBox="1"/>
+          <p:nvPr>
+            <p:ph idx="1" type="body"/>
+          </p:nvPr>
+        </p:nvSpPr>
+        <p:spPr>
+          <a:xfrm>
+            <a:off x="685800" y="4343400"/>
+            <a:ext cx="5486400" cy="4114800"/>
+          </a:xfrm>
+          <a:prstGeom prst="rect">
+            <a:avLst/>
+          </a:prstGeom>
+        </p:spPr>
+        <p:txBody>
+          <a:bodyPr anchorCtr="0" anchor="t" bIns="91425" lIns="91425" spcFirstLastPara="1" rIns="91425" wrap="square" tIns="91425">
+            <a:noAutofit/>
+          </a:bodyPr>
+          <a:lstStyle/>
+          <a:p>
+            <a:pPr indent="0" lvl="0" marL="0" rtl="0" algn="l">
+              <a:spcBef>
+                <a:spcPts val="0"/>
+              </a:spcBef>
+              <a:spcAft>
+                <a:spcPts val="0"/>
+              </a:spcAft>
+              <a:buNone/>
+            </a:pPr>
+            <a:r>
+              <a:t/>
+            </a:r>
+            <a:endParaRPr/>
+          </a:p>
+        </p:txBody>
+      </p:sp>
+    </p:spTree>
+  </p:cSld>
+  <p:clrMapOvr>
+    <a:masterClrMapping/>
+  </p:clrMapOvr>
+</p:notes>
+</file>
+
+<file path=ppt/notesSlides/notesSlide16.xml><?xml version="1.0" encoding="utf-8"?>
+<p:notes xmlns:a="http://schemas.openxmlformats.org/drawingml/2006/main" xmlns:r="http://schemas.openxmlformats.org/officeDocument/2006/relationships" xmlns:mc="http://schemas.openxmlformats.org/markup-compatibility/2006" xmlns:mv="urn:schemas-microsoft-com:mac:vml" xmlns:p="http://schemas.openxmlformats.org/presentationml/2006/main" xmlns:c="http://schemas.openxmlformats.org/drawingml/2006/chart" xmlns:dgm="http://schemas.openxmlformats.org/drawingml/2006/diagram" xmlns:o="urn:schemas-microsoft-com:office:office" xmlns:v="urn:schemas-microsoft-com:vml" xmlns:pvml="urn:schemas-microsoft-com:office:powerpoint" xmlns:com="http://schemas.openxmlformats.org/drawingml/2006/compatibility" xmlns:p14="http://schemas.microsoft.com/office/powerpoint/2010/main" xmlns:p15="http://schemas.microsoft.com/office/powerpoint/2012/main" xmlns:ahyp="http://schemas.microsoft.com/office/drawing/2018/hyperlinkcolor" showMasterPhAnim="0" showMasterSp="0">
+  <p:cSld>
+    <p:spTree>
+      <p:nvGrpSpPr>
+        <p:cNvPr id="139" name="Shape 139"/>
+        <p:cNvGrpSpPr/>
+        <p:nvPr/>
+      </p:nvGrpSpPr>
+      <p:grpSpPr>
+        <a:xfrm>
+          <a:off x="0" y="0"/>
+          <a:ext cx="0" cy="0"/>
+          <a:chOff x="0" y="0"/>
+          <a:chExt cx="0" cy="0"/>
+        </a:xfrm>
+      </p:grpSpPr>
+      <p:sp>
+        <p:nvSpPr>
+          <p:cNvPr id="140" name="Google Shape;140;g147169e43e7_0_5:notes"/>
+          <p:cNvSpPr/>
+          <p:nvPr>
+            <p:ph idx="2" type="sldImg"/>
+          </p:nvPr>
+        </p:nvSpPr>
+        <p:spPr>
+          <a:xfrm>
+            <a:off x="381300" y="685800"/>
+            <a:ext cx="6096000" cy="3429000"/>
+          </a:xfrm>
+          <a:custGeom>
+            <a:rect b="b" l="l" r="r" t="t"/>
+            <a:pathLst>
+              <a:path extrusionOk="0" h="120000" w="120000">
+                <a:moveTo>
+                  <a:pt x="0" y="0"/>
+                </a:moveTo>
+                <a:lnTo>
+                  <a:pt x="120000" y="0"/>
+                </a:lnTo>
+                <a:lnTo>
+                  <a:pt x="120000" y="120000"/>
+                </a:lnTo>
+                <a:lnTo>
+                  <a:pt x="0" y="120000"/>
+                </a:lnTo>
+                <a:close/>
+              </a:path>
+            </a:pathLst>
+          </a:custGeom>
+        </p:spPr>
+      </p:sp>
+      <p:sp>
+        <p:nvSpPr>
+          <p:cNvPr id="141" name="Google Shape;141;g147169e43e7_0_5:notes"/>
+          <p:cNvSpPr txBox="1"/>
+          <p:nvPr>
+            <p:ph idx="1" type="body"/>
+          </p:nvPr>
+        </p:nvSpPr>
+        <p:spPr>
+          <a:xfrm>
+            <a:off x="685800" y="4343400"/>
+            <a:ext cx="5486400" cy="4114800"/>
+          </a:xfrm>
+          <a:prstGeom prst="rect">
+            <a:avLst/>
+          </a:prstGeom>
+        </p:spPr>
+        <p:txBody>
+          <a:bodyPr anchorCtr="0" anchor="t" bIns="91425" lIns="91425" spcFirstLastPara="1" rIns="91425" wrap="square" tIns="91425">
+            <a:noAutofit/>
+          </a:bodyPr>
+          <a:lstStyle/>
+          <a:p>
+            <a:pPr indent="0" lvl="0" marL="0" rtl="0" algn="l">
+              <a:spcBef>
+                <a:spcPts val="0"/>
+              </a:spcBef>
+              <a:spcAft>
+                <a:spcPts val="0"/>
+              </a:spcAft>
+              <a:buNone/>
+            </a:pPr>
+            <a:r>
+              <a:t/>
+            </a:r>
+            <a:endParaRPr/>
+          </a:p>
+        </p:txBody>
+      </p:sp>
+    </p:spTree>
+  </p:cSld>
+  <p:clrMapOvr>
+    <a:masterClrMapping/>
+  </p:clrMapOvr>
+</p:notes>
+</file>
+
+<file path=ppt/notesSlides/notesSlide17.xml><?xml version="1.0" encoding="utf-8"?>
+<p:notes xmlns:a="http://schemas.openxmlformats.org/drawingml/2006/main" xmlns:r="http://schemas.openxmlformats.org/officeDocument/2006/relationships" xmlns:mc="http://schemas.openxmlformats.org/markup-compatibility/2006" xmlns:mv="urn:schemas-microsoft-com:mac:vml" xmlns:p="http://schemas.openxmlformats.org/presentationml/2006/main" xmlns:c="http://schemas.openxmlformats.org/drawingml/2006/chart" xmlns:dgm="http://schemas.openxmlformats.org/drawingml/2006/diagram" xmlns:o="urn:schemas-microsoft-com:office:office" xmlns:v="urn:schemas-microsoft-com:vml" xmlns:pvml="urn:schemas-microsoft-com:office:powerpoint" xmlns:com="http://schemas.openxmlformats.org/drawingml/2006/compatibility" xmlns:p14="http://schemas.microsoft.com/office/powerpoint/2010/main" xmlns:p15="http://schemas.microsoft.com/office/powerpoint/2012/main" xmlns:ahyp="http://schemas.microsoft.com/office/drawing/2018/hyperlinkcolor" showMasterPhAnim="0" showMasterSp="0">
+  <p:cSld>
+    <p:spTree>
+      <p:nvGrpSpPr>
+        <p:cNvPr id="145" name="Shape 145"/>
+        <p:cNvGrpSpPr/>
+        <p:nvPr/>
+      </p:nvGrpSpPr>
+      <p:grpSpPr>
+        <a:xfrm>
+          <a:off x="0" y="0"/>
+          <a:ext cx="0" cy="0"/>
+          <a:chOff x="0" y="0"/>
+          <a:chExt cx="0" cy="0"/>
+        </a:xfrm>
+      </p:grpSpPr>
+      <p:sp>
+        <p:nvSpPr>
+          <p:cNvPr id="146" name="Google Shape;146;g1494d7cf213_0_5:notes"/>
+          <p:cNvSpPr/>
+          <p:nvPr>
+            <p:ph idx="2" type="sldImg"/>
+          </p:nvPr>
+        </p:nvSpPr>
+        <p:spPr>
+          <a:xfrm>
+            <a:off x="381300" y="685800"/>
+            <a:ext cx="6096000" cy="3429000"/>
+          </a:xfrm>
+          <a:custGeom>
+            <a:rect b="b" l="l" r="r" t="t"/>
+            <a:pathLst>
+              <a:path extrusionOk="0" h="120000" w="120000">
+                <a:moveTo>
+                  <a:pt x="0" y="0"/>
+                </a:moveTo>
+                <a:lnTo>
+                  <a:pt x="120000" y="0"/>
+                </a:lnTo>
+                <a:lnTo>
+                  <a:pt x="120000" y="120000"/>
+                </a:lnTo>
+                <a:lnTo>
+                  <a:pt x="0" y="120000"/>
+                </a:lnTo>
+                <a:close/>
+              </a:path>
+            </a:pathLst>
+          </a:custGeom>
+        </p:spPr>
+      </p:sp>
+      <p:sp>
+        <p:nvSpPr>
+          <p:cNvPr id="147" name="Google Shape;147;g1494d7cf213_0_5:notes"/>
+          <p:cNvSpPr txBox="1"/>
+          <p:nvPr>
+            <p:ph idx="1" type="body"/>
+          </p:nvPr>
+        </p:nvSpPr>
+        <p:spPr>
+          <a:xfrm>
+            <a:off x="685800" y="4343400"/>
+            <a:ext cx="5486400" cy="4114800"/>
+          </a:xfrm>
+          <a:prstGeom prst="rect">
+            <a:avLst/>
+          </a:prstGeom>
+        </p:spPr>
+        <p:txBody>
+          <a:bodyPr anchorCtr="0" anchor="t" bIns="91425" lIns="91425" spcFirstLastPara="1" rIns="91425" wrap="square" tIns="91425">
+            <a:noAutofit/>
+          </a:bodyPr>
+          <a:lstStyle/>
+          <a:p>
+            <a:pPr indent="0" lvl="0" marL="0" rtl="0" algn="l">
+              <a:spcBef>
+                <a:spcPts val="0"/>
+              </a:spcBef>
+              <a:spcAft>
+                <a:spcPts val="0"/>
+              </a:spcAft>
+              <a:buNone/>
+            </a:pPr>
+            <a:r>
+              <a:t/>
+            </a:r>
+            <a:endParaRPr/>
+          </a:p>
+        </p:txBody>
+      </p:sp>
+    </p:spTree>
+  </p:cSld>
+  <p:clrMapOvr>
+    <a:masterClrMapping/>
+  </p:clrMapOvr>
+</p:notes>
+</file>
+
+<file path=ppt/notesSlides/notesSlide18.xml><?xml version="1.0" encoding="utf-8"?>
+<p:notes xmlns:a="http://schemas.openxmlformats.org/drawingml/2006/main" xmlns:r="http://schemas.openxmlformats.org/officeDocument/2006/relationships" xmlns:mc="http://schemas.openxmlformats.org/markup-compatibility/2006" xmlns:mv="urn:schemas-microsoft-com:mac:vml" xmlns:p="http://schemas.openxmlformats.org/presentationml/2006/main" xmlns:c="http://schemas.openxmlformats.org/drawingml/2006/chart" xmlns:dgm="http://schemas.openxmlformats.org/drawingml/2006/diagram" xmlns:o="urn:schemas-microsoft-com:office:office" xmlns:v="urn:schemas-microsoft-com:vml" xmlns:pvml="urn:schemas-microsoft-com:office:powerpoint" xmlns:com="http://schemas.openxmlformats.org/drawingml/2006/compatibility" xmlns:p14="http://schemas.microsoft.com/office/powerpoint/2010/main" xmlns:p15="http://schemas.microsoft.com/office/powerpoint/2012/main" xmlns:ahyp="http://schemas.microsoft.com/office/drawing/2018/hyperlinkcolor" showMasterPhAnim="0" showMasterSp="0">
+  <p:cSld>
+    <p:spTree>
+      <p:nvGrpSpPr>
+        <p:cNvPr id="151" name="Shape 151"/>
+        <p:cNvGrpSpPr/>
+        <p:nvPr/>
+      </p:nvGrpSpPr>
+      <p:grpSpPr>
+        <a:xfrm>
+          <a:off x="0" y="0"/>
+          <a:ext cx="0" cy="0"/>
+          <a:chOff x="0" y="0"/>
+          <a:chExt cx="0" cy="0"/>
+        </a:xfrm>
+      </p:grpSpPr>
+      <p:sp>
+        <p:nvSpPr>
+          <p:cNvPr id="152" name="Google Shape;152;gfe7e85061c_0_2:notes"/>
+          <p:cNvSpPr/>
+          <p:nvPr>
+            <p:ph idx="2" type="sldImg"/>
+          </p:nvPr>
+        </p:nvSpPr>
+        <p:spPr>
+          <a:xfrm>
+            <a:off x="381300" y="685800"/>
+            <a:ext cx="6096000" cy="3429000"/>
+          </a:xfrm>
+          <a:custGeom>
+            <a:rect b="b" l="l" r="r" t="t"/>
+            <a:pathLst>
+              <a:path extrusionOk="0" h="120000" w="120000">
+                <a:moveTo>
+                  <a:pt x="0" y="0"/>
+                </a:moveTo>
+                <a:lnTo>
+                  <a:pt x="120000" y="0"/>
+                </a:lnTo>
+                <a:lnTo>
+                  <a:pt x="120000" y="120000"/>
+                </a:lnTo>
+                <a:lnTo>
+                  <a:pt x="0" y="120000"/>
+                </a:lnTo>
+                <a:close/>
+              </a:path>
+            </a:pathLst>
+          </a:custGeom>
+        </p:spPr>
+      </p:sp>
+      <p:sp>
+        <p:nvSpPr>
+          <p:cNvPr id="153" name="Google Shape;153;gfe7e85061c_0_2:notes"/>
           <p:cNvSpPr txBox="1"/>
           <p:nvPr>
             <p:ph idx="1" type="body"/>
@@ -1396,7 +1912,7 @@
   <p:cSld>
     <p:spTree>
       <p:nvGrpSpPr>
-        <p:cNvPr id="68" name="Shape 68"/>
+        <p:cNvPr id="69" name="Shape 69"/>
         <p:cNvGrpSpPr/>
         <p:nvPr/>
       </p:nvGrpSpPr>
@@ -1410,7 +1926,7 @@
       </p:grpSpPr>
       <p:sp>
         <p:nvSpPr>
-          <p:cNvPr id="69" name="Google Shape;69;g147169e43e7_0_63:notes"/>
+          <p:cNvPr id="70" name="Google Shape;70;g147169e43e7_0_63:notes"/>
           <p:cNvSpPr/>
           <p:nvPr>
             <p:ph idx="2" type="sldImg"/>
@@ -1445,7 +1961,7 @@
       </p:sp>
       <p:sp>
         <p:nvSpPr>
-          <p:cNvPr id="70" name="Google Shape;70;g147169e43e7_0_63:notes"/>
+          <p:cNvPr id="71" name="Google Shape;71;g147169e43e7_0_63:notes"/>
           <p:cNvSpPr txBox="1"/>
           <p:nvPr>
             <p:ph idx="1" type="body"/>
@@ -1495,7 +2011,7 @@
   <p:cSld>
     <p:spTree>
       <p:nvGrpSpPr>
-        <p:cNvPr id="74" name="Shape 74"/>
+        <p:cNvPr id="75" name="Shape 75"/>
         <p:cNvGrpSpPr/>
         <p:nvPr/>
       </p:nvGrpSpPr>
@@ -1509,7 +2025,7 @@
       </p:grpSpPr>
       <p:sp>
         <p:nvSpPr>
-          <p:cNvPr id="75" name="Google Shape;75;g147169e43e7_0_55:notes"/>
+          <p:cNvPr id="76" name="Google Shape;76;g147169e43e7_0_55:notes"/>
           <p:cNvSpPr/>
           <p:nvPr>
             <p:ph idx="2" type="sldImg"/>
@@ -1544,7 +2060,7 @@
       </p:sp>
       <p:sp>
         <p:nvSpPr>
-          <p:cNvPr id="76" name="Google Shape;76;g147169e43e7_0_55:notes"/>
+          <p:cNvPr id="77" name="Google Shape;77;g147169e43e7_0_55:notes"/>
           <p:cNvSpPr txBox="1"/>
           <p:nvPr>
             <p:ph idx="1" type="body"/>
@@ -1594,7 +2110,7 @@
   <p:cSld>
     <p:spTree>
       <p:nvGrpSpPr>
-        <p:cNvPr id="80" name="Shape 80"/>
+        <p:cNvPr id="81" name="Shape 81"/>
         <p:cNvGrpSpPr/>
         <p:nvPr/>
       </p:nvGrpSpPr>
@@ -1608,7 +2124,7 @@
       </p:grpSpPr>
       <p:sp>
         <p:nvSpPr>
-          <p:cNvPr id="81" name="Google Shape;81;g147169e43e7_0_44:notes"/>
+          <p:cNvPr id="82" name="Google Shape;82;g147169e43e7_0_44:notes"/>
           <p:cNvSpPr/>
           <p:nvPr>
             <p:ph idx="2" type="sldImg"/>
@@ -1643,7 +2159,7 @@
       </p:sp>
       <p:sp>
         <p:nvSpPr>
-          <p:cNvPr id="82" name="Google Shape;82;g147169e43e7_0_44:notes"/>
+          <p:cNvPr id="83" name="Google Shape;83;g147169e43e7_0_44:notes"/>
           <p:cNvSpPr txBox="1"/>
           <p:nvPr>
             <p:ph idx="1" type="body"/>
@@ -1693,7 +2209,7 @@
   <p:cSld>
     <p:spTree>
       <p:nvGrpSpPr>
-        <p:cNvPr id="85" name="Shape 85"/>
+        <p:cNvPr id="86" name="Shape 86"/>
         <p:cNvGrpSpPr/>
         <p:nvPr/>
       </p:nvGrpSpPr>
@@ -1707,7 +2223,7 @@
       </p:grpSpPr>
       <p:sp>
         <p:nvSpPr>
-          <p:cNvPr id="86" name="Google Shape;86;g147169e43e7_0_68:notes"/>
+          <p:cNvPr id="87" name="Google Shape;87;g147169e43e7_0_68:notes"/>
           <p:cNvSpPr/>
           <p:nvPr>
             <p:ph idx="2" type="sldImg"/>
@@ -1742,7 +2258,7 @@
       </p:sp>
       <p:sp>
         <p:nvSpPr>
-          <p:cNvPr id="87" name="Google Shape;87;g147169e43e7_0_68:notes"/>
+          <p:cNvPr id="88" name="Google Shape;88;g147169e43e7_0_68:notes"/>
           <p:cNvSpPr txBox="1"/>
           <p:nvPr>
             <p:ph idx="1" type="body"/>
@@ -1792,7 +2308,7 @@
   <p:cSld>
     <p:spTree>
       <p:nvGrpSpPr>
-        <p:cNvPr id="91" name="Shape 91"/>
+        <p:cNvPr id="92" name="Shape 92"/>
         <p:cNvGrpSpPr/>
         <p:nvPr/>
       </p:nvGrpSpPr>
@@ -1806,7 +2322,7 @@
       </p:grpSpPr>
       <p:sp>
         <p:nvSpPr>
-          <p:cNvPr id="92" name="Google Shape;92;g147169e43e7_0_39:notes"/>
+          <p:cNvPr id="93" name="Google Shape;93;g147169e43e7_0_39:notes"/>
           <p:cNvSpPr/>
           <p:nvPr>
             <p:ph idx="2" type="sldImg"/>
@@ -1841,7 +2357,7 @@
       </p:sp>
       <p:sp>
         <p:nvSpPr>
-          <p:cNvPr id="93" name="Google Shape;93;g147169e43e7_0_39:notes"/>
+          <p:cNvPr id="94" name="Google Shape;94;g147169e43e7_0_39:notes"/>
           <p:cNvSpPr txBox="1"/>
           <p:nvPr>
             <p:ph idx="1" type="body"/>
@@ -1891,7 +2407,7 @@
   <p:cSld>
     <p:spTree>
       <p:nvGrpSpPr>
-        <p:cNvPr id="97" name="Shape 97"/>
+        <p:cNvPr id="98" name="Shape 98"/>
         <p:cNvGrpSpPr/>
         <p:nvPr/>
       </p:nvGrpSpPr>
@@ -1905,7 +2421,7 @@
       </p:grpSpPr>
       <p:sp>
         <p:nvSpPr>
-          <p:cNvPr id="98" name="Google Shape;98;g147169e43e7_0_49:notes"/>
+          <p:cNvPr id="99" name="Google Shape;99;g147169e43e7_0_49:notes"/>
           <p:cNvSpPr/>
           <p:nvPr>
             <p:ph idx="2" type="sldImg"/>
@@ -1940,7 +2456,7 @@
       </p:sp>
       <p:sp>
         <p:nvSpPr>
-          <p:cNvPr id="99" name="Google Shape;99;g147169e43e7_0_49:notes"/>
+          <p:cNvPr id="100" name="Google Shape;100;g147169e43e7_0_49:notes"/>
           <p:cNvSpPr txBox="1"/>
           <p:nvPr>
             <p:ph idx="1" type="body"/>
@@ -5434,11 +5950,16 @@
                 <a:schemeClr val="dk1"/>
               </a:buClr>
               <a:buSzPts val="2800"/>
+              <a:buFont typeface="Merriweather"/>
               <a:buNone/>
               <a:defRPr sz="2800">
                 <a:solidFill>
                   <a:schemeClr val="dk1"/>
                 </a:solidFill>
+                <a:latin typeface="Merriweather"/>
+                <a:ea typeface="Merriweather"/>
+                <a:cs typeface="Merriweather"/>
+                <a:sym typeface="Merriweather"/>
               </a:defRPr>
             </a:lvl1pPr>
             <a:lvl2pPr lvl="1" rtl="0">
@@ -5629,11 +6150,16 @@
                 <a:schemeClr val="dk2"/>
               </a:buClr>
               <a:buSzPts val="1800"/>
+              <a:buFont typeface="Merriweather"/>
               <a:buChar char="●"/>
               <a:defRPr sz="1800">
                 <a:solidFill>
                   <a:schemeClr val="dk2"/>
                 </a:solidFill>
+                <a:latin typeface="Merriweather"/>
+                <a:ea typeface="Merriweather"/>
+                <a:cs typeface="Merriweather"/>
+                <a:sym typeface="Merriweather"/>
               </a:defRPr>
             </a:lvl1pPr>
             <a:lvl2pPr indent="-317500" lvl="1" marL="914400" rtl="0">
@@ -5650,11 +6176,16 @@
                 <a:schemeClr val="dk2"/>
               </a:buClr>
               <a:buSzPts val="1400"/>
+              <a:buFont typeface="Merriweather"/>
               <a:buChar char="○"/>
               <a:defRPr>
                 <a:solidFill>
                   <a:schemeClr val="dk2"/>
                 </a:solidFill>
+                <a:latin typeface="Merriweather"/>
+                <a:ea typeface="Merriweather"/>
+                <a:cs typeface="Merriweather"/>
+                <a:sym typeface="Merriweather"/>
               </a:defRPr>
             </a:lvl2pPr>
             <a:lvl3pPr indent="-317500" lvl="2" marL="1371600" rtl="0">
@@ -5671,11 +6202,16 @@
                 <a:schemeClr val="dk2"/>
               </a:buClr>
               <a:buSzPts val="1400"/>
+              <a:buFont typeface="Merriweather"/>
               <a:buChar char="■"/>
               <a:defRPr>
                 <a:solidFill>
                   <a:schemeClr val="dk2"/>
                 </a:solidFill>
+                <a:latin typeface="Merriweather"/>
+                <a:ea typeface="Merriweather"/>
+                <a:cs typeface="Merriweather"/>
+                <a:sym typeface="Merriweather"/>
               </a:defRPr>
             </a:lvl3pPr>
             <a:lvl4pPr indent="-317500" lvl="3" marL="1828800" rtl="0">
@@ -5692,11 +6228,16 @@
                 <a:schemeClr val="dk2"/>
               </a:buClr>
               <a:buSzPts val="1400"/>
+              <a:buFont typeface="Merriweather"/>
               <a:buChar char="●"/>
               <a:defRPr>
                 <a:solidFill>
                   <a:schemeClr val="dk2"/>
                 </a:solidFill>
+                <a:latin typeface="Merriweather"/>
+                <a:ea typeface="Merriweather"/>
+                <a:cs typeface="Merriweather"/>
+                <a:sym typeface="Merriweather"/>
               </a:defRPr>
             </a:lvl4pPr>
             <a:lvl5pPr indent="-317500" lvl="4" marL="2286000" rtl="0">
@@ -5713,11 +6254,16 @@
                 <a:schemeClr val="dk2"/>
               </a:buClr>
               <a:buSzPts val="1400"/>
+              <a:buFont typeface="Merriweather"/>
               <a:buChar char="○"/>
               <a:defRPr>
                 <a:solidFill>
                   <a:schemeClr val="dk2"/>
                 </a:solidFill>
+                <a:latin typeface="Merriweather"/>
+                <a:ea typeface="Merriweather"/>
+                <a:cs typeface="Merriweather"/>
+                <a:sym typeface="Merriweather"/>
               </a:defRPr>
             </a:lvl5pPr>
             <a:lvl6pPr indent="-317500" lvl="5" marL="2743200" rtl="0">
@@ -5734,11 +6280,16 @@
                 <a:schemeClr val="dk2"/>
               </a:buClr>
               <a:buSzPts val="1400"/>
+              <a:buFont typeface="Merriweather"/>
               <a:buChar char="■"/>
               <a:defRPr>
                 <a:solidFill>
                   <a:schemeClr val="dk2"/>
                 </a:solidFill>
+                <a:latin typeface="Merriweather"/>
+                <a:ea typeface="Merriweather"/>
+                <a:cs typeface="Merriweather"/>
+                <a:sym typeface="Merriweather"/>
               </a:defRPr>
             </a:lvl6pPr>
             <a:lvl7pPr indent="-317500" lvl="6" marL="3200400" rtl="0">
@@ -5755,11 +6306,16 @@
                 <a:schemeClr val="dk2"/>
               </a:buClr>
               <a:buSzPts val="1400"/>
+              <a:buFont typeface="Merriweather"/>
               <a:buChar char="●"/>
               <a:defRPr>
                 <a:solidFill>
                   <a:schemeClr val="dk2"/>
                 </a:solidFill>
+                <a:latin typeface="Merriweather"/>
+                <a:ea typeface="Merriweather"/>
+                <a:cs typeface="Merriweather"/>
+                <a:sym typeface="Merriweather"/>
               </a:defRPr>
             </a:lvl7pPr>
             <a:lvl8pPr indent="-317500" lvl="7" marL="3657600" rtl="0">
@@ -5776,11 +6332,16 @@
                 <a:schemeClr val="dk2"/>
               </a:buClr>
               <a:buSzPts val="1400"/>
+              <a:buFont typeface="Merriweather"/>
               <a:buChar char="○"/>
               <a:defRPr>
                 <a:solidFill>
                   <a:schemeClr val="dk2"/>
                 </a:solidFill>
+                <a:latin typeface="Merriweather"/>
+                <a:ea typeface="Merriweather"/>
+                <a:cs typeface="Merriweather"/>
+                <a:sym typeface="Merriweather"/>
               </a:defRPr>
             </a:lvl8pPr>
             <a:lvl9pPr indent="-317500" lvl="8" marL="4114800" rtl="0">
@@ -5797,11 +6358,16 @@
                 <a:schemeClr val="dk2"/>
               </a:buClr>
               <a:buSzPts val="1400"/>
+              <a:buFont typeface="Merriweather"/>
               <a:buChar char="■"/>
               <a:defRPr>
                 <a:solidFill>
                   <a:schemeClr val="dk2"/>
                 </a:solidFill>
+                <a:latin typeface="Merriweather"/>
+                <a:ea typeface="Merriweather"/>
+                <a:cs typeface="Merriweather"/>
+                <a:sym typeface="Merriweather"/>
               </a:defRPr>
             </a:lvl9pPr>
           </a:lstStyle>
@@ -6743,7 +7309,7 @@
   <p:cSld>
     <p:spTree>
       <p:nvGrpSpPr>
-        <p:cNvPr id="106" name="Shape 106"/>
+        <p:cNvPr id="107" name="Shape 107"/>
         <p:cNvGrpSpPr/>
         <p:nvPr/>
       </p:nvGrpSpPr>
@@ -6757,7 +7323,7 @@
       </p:grpSpPr>
       <p:sp>
         <p:nvSpPr>
-          <p:cNvPr id="107" name="Google Shape;107;p22"/>
+          <p:cNvPr id="108" name="Google Shape;108;p22"/>
           <p:cNvSpPr txBox="1"/>
           <p:nvPr>
             <p:ph type="title"/>
@@ -6797,7 +7363,7 @@
       </p:sp>
       <p:sp>
         <p:nvSpPr>
-          <p:cNvPr id="108" name="Google Shape;108;p22"/>
+          <p:cNvPr id="109" name="Google Shape;109;p22"/>
           <p:cNvSpPr txBox="1"/>
           <p:nvPr>
             <p:ph idx="1" type="body"/>
@@ -6830,7 +7396,7 @@
             </a:pPr>
             <a:r>
               <a:rPr lang="en"/>
-              <a:t>main</a:t>
+              <a:t>Start with main branch</a:t>
             </a:r>
             <a:endParaRPr/>
           </a:p>
@@ -6847,7 +7413,7 @@
             </a:pPr>
             <a:r>
               <a:rPr lang="en"/>
-              <a:t>merge branch bmaden-usds/test-add-operator</a:t>
+              <a:t>Merge branch bmaden-usds/test-add-operator</a:t>
             </a:r>
             <a:endParaRPr/>
           </a:p>
@@ -6864,7 +7430,55 @@
             </a:pPr>
             <a:r>
               <a:rPr lang="en"/>
-              <a:t>merge branch bmaden-usds/divide-operator</a:t>
+              <a:t>Merge branch bmaden-usds/divide-operator</a:t>
+            </a:r>
+            <a:endParaRPr/>
+          </a:p>
+          <a:p>
+            <a:pPr indent="-342900" lvl="0" marL="457200" rtl="0" algn="l">
+              <a:spcBef>
+                <a:spcPts val="0"/>
+              </a:spcBef>
+              <a:spcAft>
+                <a:spcPts val="0"/>
+              </a:spcAft>
+              <a:buSzPts val="1800"/>
+              <a:buChar char="-"/>
+            </a:pPr>
+            <a:r>
+              <a:rPr lang="en"/>
+              <a:t>Use github.com tools to resolve the merge conflict</a:t>
+            </a:r>
+            <a:endParaRPr/>
+          </a:p>
+          <a:p>
+            <a:pPr indent="0" lvl="0" marL="0" rtl="0" algn="l">
+              <a:spcBef>
+                <a:spcPts val="1200"/>
+              </a:spcBef>
+              <a:spcAft>
+                <a:spcPts val="0"/>
+              </a:spcAft>
+              <a:buNone/>
+            </a:pPr>
+            <a:r>
+              <a:t/>
+            </a:r>
+            <a:endParaRPr/>
+          </a:p>
+          <a:p>
+            <a:pPr indent="0" lvl="0" marL="0" rtl="0" algn="l">
+              <a:spcBef>
+                <a:spcPts val="1200"/>
+              </a:spcBef>
+              <a:spcAft>
+                <a:spcPts val="1200"/>
+              </a:spcAft>
+              <a:buNone/>
+            </a:pPr>
+            <a:r>
+              <a:rPr lang="en"/>
+              <a:t>Viewing diffs on github.com: https://github.com/[user|org]/[repo]/compare</a:t>
             </a:r>
             <a:endParaRPr/>
           </a:p>
@@ -6883,7 +7497,7 @@
   <p:cSld>
     <p:spTree>
       <p:nvGrpSpPr>
-        <p:cNvPr id="112" name="Shape 112"/>
+        <p:cNvPr id="113" name="Shape 113"/>
         <p:cNvGrpSpPr/>
         <p:nvPr/>
       </p:nvGrpSpPr>
@@ -6897,7 +7511,7 @@
       </p:grpSpPr>
       <p:sp>
         <p:nvSpPr>
-          <p:cNvPr id="113" name="Google Shape;113;p23"/>
+          <p:cNvPr id="114" name="Google Shape;114;p23"/>
           <p:cNvSpPr txBox="1"/>
           <p:nvPr>
             <p:ph type="title"/>
@@ -6905,106 +7519,31 @@
         </p:nvSpPr>
         <p:spPr>
           <a:xfrm>
-            <a:off x="311700" y="445025"/>
-            <a:ext cx="8520600" cy="572700"/>
+            <a:off x="311700" y="2150850"/>
+            <a:ext cx="8520600" cy="841800"/>
           </a:xfrm>
           <a:prstGeom prst="rect">
             <a:avLst/>
           </a:prstGeom>
         </p:spPr>
         <p:txBody>
-          <a:bodyPr anchorCtr="0" anchor="t" bIns="91425" lIns="91425" spcFirstLastPara="1" rIns="91425" wrap="square" tIns="91425">
-            <a:normAutofit fontScale="90000"/>
-          </a:bodyPr>
-          <a:lstStyle/>
-          <a:p>
-            <a:pPr indent="0" lvl="0" marL="0" rtl="0" algn="l">
-              <a:spcBef>
-                <a:spcPts val="0"/>
-              </a:spcBef>
-              <a:spcAft>
-                <a:spcPts val="0"/>
-              </a:spcAft>
-              <a:buNone/>
-            </a:pPr>
-            <a:r>
-              <a:rPr lang="en"/>
-              <a:t>Automation</a:t>
-            </a:r>
-            <a:endParaRPr/>
-          </a:p>
-        </p:txBody>
-      </p:sp>
-      <p:sp>
-        <p:nvSpPr>
-          <p:cNvPr id="114" name="Google Shape;114;p23"/>
-          <p:cNvSpPr txBox="1"/>
-          <p:nvPr>
-            <p:ph idx="1" type="body"/>
-          </p:nvPr>
-        </p:nvSpPr>
-        <p:spPr>
-          <a:xfrm>
-            <a:off x="311700" y="1152475"/>
-            <a:ext cx="8520600" cy="3416400"/>
-          </a:xfrm>
-          <a:prstGeom prst="rect">
-            <a:avLst/>
-          </a:prstGeom>
-        </p:spPr>
-        <p:txBody>
-          <a:bodyPr anchorCtr="0" anchor="t" bIns="91425" lIns="91425" spcFirstLastPara="1" rIns="91425" wrap="square" tIns="91425">
+          <a:bodyPr anchorCtr="0" anchor="ctr" bIns="91425" lIns="91425" spcFirstLastPara="1" rIns="91425" wrap="square" tIns="91425">
             <a:normAutofit/>
           </a:bodyPr>
           <a:lstStyle/>
           <a:p>
-            <a:pPr indent="-342900" lvl="0" marL="457200" rtl="0" algn="l">
-              <a:spcBef>
-                <a:spcPts val="0"/>
-              </a:spcBef>
-              <a:spcAft>
-                <a:spcPts val="0"/>
-              </a:spcAft>
-              <a:buSzPts val="1800"/>
-              <a:buChar char="-"/>
+            <a:pPr indent="0" lvl="0" marL="0" rtl="0" algn="ctr">
+              <a:spcBef>
+                <a:spcPts val="0"/>
+              </a:spcBef>
+              <a:spcAft>
+                <a:spcPts val="0"/>
+              </a:spcAft>
+              <a:buNone/>
             </a:pPr>
             <a:r>
               <a:rPr lang="en"/>
-              <a:t>Now there are some tests in our repository</a:t>
-            </a:r>
-            <a:endParaRPr/>
-          </a:p>
-          <a:p>
-            <a:pPr indent="-342900" lvl="0" marL="457200" rtl="0" algn="l">
-              <a:spcBef>
-                <a:spcPts val="0"/>
-              </a:spcBef>
-              <a:spcAft>
-                <a:spcPts val="0"/>
-              </a:spcAft>
-              <a:buSzPts val="1800"/>
-              <a:buChar char="-"/>
-            </a:pPr>
-            <a:r>
-              <a:rPr lang="en"/>
-              <a:t>Run them when certain events occur in the repository</a:t>
-            </a:r>
-            <a:endParaRPr/>
-          </a:p>
-          <a:p>
-            <a:pPr indent="-342900" lvl="0" marL="457200" rtl="0" algn="l">
-              <a:spcBef>
-                <a:spcPts val="0"/>
-              </a:spcBef>
-              <a:spcAft>
-                <a:spcPts val="0"/>
-              </a:spcAft>
-              <a:buSzPts val="1800"/>
-              <a:buChar char="-"/>
-            </a:pPr>
-            <a:r>
-              <a:rPr lang="en"/>
-              <a:t>merge branch bmaden-usds/run-tests</a:t>
+              <a:t>End of session 1</a:t>
             </a:r>
             <a:endParaRPr/>
           </a:p>
@@ -7069,7 +7608,7 @@
             </a:pPr>
             <a:r>
               <a:rPr lang="en"/>
-              <a:t>Dependency vulnerability scanning</a:t>
+              <a:t>PR Review</a:t>
             </a:r>
             <a:endParaRPr/>
           </a:p>
@@ -7110,7 +7649,7 @@
             </a:pPr>
             <a:r>
               <a:rPr lang="en"/>
-              <a:t>enable dependabot</a:t>
+              <a:t>[user1] Look at a pull request that is awaiting review</a:t>
             </a:r>
             <a:endParaRPr/>
           </a:p>
@@ -7127,16 +7666,58 @@
             </a:pPr>
             <a:r>
               <a:rPr lang="en"/>
-              <a:t>example: </a:t>
+              <a:t>[user1] Comment, request changes</a:t>
             </a:r>
+            <a:endParaRPr/>
+          </a:p>
+          <a:p>
+            <a:pPr indent="-342900" lvl="0" marL="457200" rtl="0" algn="l">
+              <a:spcBef>
+                <a:spcPts val="0"/>
+              </a:spcBef>
+              <a:spcAft>
+                <a:spcPts val="0"/>
+              </a:spcAft>
+              <a:buSzPts val="1800"/>
+              <a:buChar char="-"/>
+            </a:pPr>
             <a:r>
-              <a:rPr lang="en" u="sng">
-                <a:solidFill>
-                  <a:schemeClr val="hlink"/>
-                </a:solidFill>
-                <a:hlinkClick r:id="rId3"/>
-              </a:rPr>
-              <a:t>https://github.com/CDCgov/prime-reportstream/pull/5329</a:t>
+              <a:rPr lang="en"/>
+              <a:t>[user2] Update PR to address changes</a:t>
+            </a:r>
+            <a:endParaRPr/>
+          </a:p>
+          <a:p>
+            <a:pPr indent="-342900" lvl="0" marL="457200" rtl="0" algn="l">
+              <a:spcBef>
+                <a:spcPts val="0"/>
+              </a:spcBef>
+              <a:spcAft>
+                <a:spcPts val="0"/>
+              </a:spcAft>
+              <a:buSzPts val="1800"/>
+              <a:buChar char="-"/>
+            </a:pPr>
+            <a:r>
+              <a:rPr lang="en"/>
+              <a:t>[user1] Approve</a:t>
+            </a:r>
+            <a:endParaRPr/>
+          </a:p>
+          <a:p>
+            <a:pPr indent="-342900" lvl="0" marL="457200" rtl="0" algn="l">
+              <a:spcBef>
+                <a:spcPts val="0"/>
+              </a:spcBef>
+              <a:spcAft>
+                <a:spcPts val="0"/>
+              </a:spcAft>
+              <a:buSzPts val="1800"/>
+              <a:buChar char="-"/>
+            </a:pPr>
+            <a:r>
+              <a:rPr lang="en"/>
+              <a:t>[user2] Merge the changes into the target branch</a:t>
             </a:r>
             <a:endParaRPr/>
           </a:p>
@@ -7201,7 +7782,7 @@
             </a:pPr>
             <a:r>
               <a:rPr lang="en"/>
-              <a:t>Reducing diffs</a:t>
+              <a:t>PR review</a:t>
             </a:r>
             <a:endParaRPr/>
           </a:p>
@@ -7241,8 +7822,13 @@
               <a:buChar char="-"/>
             </a:pPr>
             <a:r>
-              <a:rPr lang="en"/>
-              <a:t>formatting, for example using spotless</a:t>
+              <a:rPr lang="en" u="sng">
+                <a:solidFill>
+                  <a:schemeClr val="hlink"/>
+                </a:solidFill>
+                <a:hlinkClick r:id="rId3"/>
+              </a:rPr>
+              <a:t>https://github.com/bmaden/git-demo/pull/8</a:t>
             </a:r>
             <a:endParaRPr/>
           </a:p>
@@ -7259,7 +7845,7 @@
             </a:pPr>
             <a:r>
               <a:rPr lang="en"/>
-              <a:t>then check for it when pull requests occur</a:t>
+              <a:t>PR has a review already already</a:t>
             </a:r>
             <a:endParaRPr/>
           </a:p>
@@ -7276,7 +7862,1011 @@
             </a:pPr>
             <a:r>
               <a:rPr lang="en"/>
-              <a:t>merge branch bmaden-usds/add-spotless</a:t>
+              <a:t>Address the comments</a:t>
+            </a:r>
+            <a:endParaRPr/>
+          </a:p>
+          <a:p>
+            <a:pPr indent="-342900" lvl="0" marL="457200" rtl="0" algn="l">
+              <a:spcBef>
+                <a:spcPts val="0"/>
+              </a:spcBef>
+              <a:spcAft>
+                <a:spcPts val="0"/>
+              </a:spcAft>
+              <a:buSzPts val="1800"/>
+              <a:buChar char="-"/>
+            </a:pPr>
+            <a:r>
+              <a:rPr lang="en"/>
+              <a:t>Complete review</a:t>
+            </a:r>
+            <a:endParaRPr/>
+          </a:p>
+          <a:p>
+            <a:pPr indent="0" lvl="0" marL="0" rtl="0" algn="l">
+              <a:spcBef>
+                <a:spcPts val="1200"/>
+              </a:spcBef>
+              <a:spcAft>
+                <a:spcPts val="0"/>
+              </a:spcAft>
+              <a:buNone/>
+            </a:pPr>
+            <a:r>
+              <a:t/>
+            </a:r>
+            <a:endParaRPr/>
+          </a:p>
+          <a:p>
+            <a:pPr indent="0" lvl="0" marL="0" rtl="0" algn="l">
+              <a:spcBef>
+                <a:spcPts val="1200"/>
+              </a:spcBef>
+              <a:spcAft>
+                <a:spcPts val="0"/>
+              </a:spcAft>
+              <a:buNone/>
+            </a:pPr>
+            <a:r>
+              <a:rPr lang="en"/>
+              <a:t>Tip:  Filter PRs by "awaiting review by you"</a:t>
+            </a:r>
+            <a:endParaRPr/>
+          </a:p>
+          <a:p>
+            <a:pPr indent="0" lvl="0" marL="0" rtl="0" algn="l">
+              <a:spcBef>
+                <a:spcPts val="1200"/>
+              </a:spcBef>
+              <a:spcAft>
+                <a:spcPts val="1200"/>
+              </a:spcAft>
+              <a:buNone/>
+            </a:pPr>
+            <a:r>
+              <a:rPr lang="en" u="sng">
+                <a:solidFill>
+                  <a:schemeClr val="hlink"/>
+                </a:solidFill>
+                <a:hlinkClick r:id="rId4"/>
+              </a:rPr>
+              <a:t>Filtered pull request list</a:t>
+            </a:r>
+            <a:endParaRPr/>
+          </a:p>
+        </p:txBody>
+      </p:sp>
+    </p:spTree>
+  </p:cSld>
+  <p:clrMapOvr>
+    <a:masterClrMapping/>
+  </p:clrMapOvr>
+</p:sld>
+</file>
+
+<file path=ppt/slides/slide14.xml><?xml version="1.0" encoding="utf-8"?>
+<p:sld xmlns:a="http://schemas.openxmlformats.org/drawingml/2006/main" xmlns:r="http://schemas.openxmlformats.org/officeDocument/2006/relationships" xmlns:mc="http://schemas.openxmlformats.org/markup-compatibility/2006" xmlns:mv="urn:schemas-microsoft-com:mac:vml" xmlns:p="http://schemas.openxmlformats.org/presentationml/2006/main" xmlns:c="http://schemas.openxmlformats.org/drawingml/2006/chart" xmlns:dgm="http://schemas.openxmlformats.org/drawingml/2006/diagram" xmlns:o="urn:schemas-microsoft-com:office:office" xmlns:v="urn:schemas-microsoft-com:vml" xmlns:pvml="urn:schemas-microsoft-com:office:powerpoint" xmlns:com="http://schemas.openxmlformats.org/drawingml/2006/compatibility" xmlns:p14="http://schemas.microsoft.com/office/powerpoint/2010/main" xmlns:p15="http://schemas.microsoft.com/office/powerpoint/2012/main" xmlns:ahyp="http://schemas.microsoft.com/office/drawing/2018/hyperlinkcolor">
+  <p:cSld>
+    <p:spTree>
+      <p:nvGrpSpPr>
+        <p:cNvPr id="130" name="Shape 130"/>
+        <p:cNvGrpSpPr/>
+        <p:nvPr/>
+      </p:nvGrpSpPr>
+      <p:grpSpPr>
+        <a:xfrm>
+          <a:off x="0" y="0"/>
+          <a:ext cx="0" cy="0"/>
+          <a:chOff x="0" y="0"/>
+          <a:chExt cx="0" cy="0"/>
+        </a:xfrm>
+      </p:grpSpPr>
+      <p:sp>
+        <p:nvSpPr>
+          <p:cNvPr id="131" name="Google Shape;131;p26"/>
+          <p:cNvSpPr txBox="1"/>
+          <p:nvPr>
+            <p:ph type="title"/>
+          </p:nvPr>
+        </p:nvSpPr>
+        <p:spPr>
+          <a:xfrm>
+            <a:off x="311700" y="445025"/>
+            <a:ext cx="8520600" cy="572700"/>
+          </a:xfrm>
+          <a:prstGeom prst="rect">
+            <a:avLst/>
+          </a:prstGeom>
+        </p:spPr>
+        <p:txBody>
+          <a:bodyPr anchorCtr="0" anchor="t" bIns="91425" lIns="91425" spcFirstLastPara="1" rIns="91425" wrap="square" tIns="91425">
+            <a:normAutofit fontScale="90000"/>
+          </a:bodyPr>
+          <a:lstStyle/>
+          <a:p>
+            <a:pPr indent="0" lvl="0" marL="0" rtl="0" algn="l">
+              <a:spcBef>
+                <a:spcPts val="0"/>
+              </a:spcBef>
+              <a:spcAft>
+                <a:spcPts val="0"/>
+              </a:spcAft>
+              <a:buNone/>
+            </a:pPr>
+            <a:r>
+              <a:rPr lang="en"/>
+              <a:t>Automation</a:t>
+            </a:r>
+            <a:endParaRPr/>
+          </a:p>
+        </p:txBody>
+      </p:sp>
+      <p:sp>
+        <p:nvSpPr>
+          <p:cNvPr id="132" name="Google Shape;132;p26"/>
+          <p:cNvSpPr txBox="1"/>
+          <p:nvPr>
+            <p:ph idx="1" type="body"/>
+          </p:nvPr>
+        </p:nvSpPr>
+        <p:spPr>
+          <a:xfrm>
+            <a:off x="311700" y="1152475"/>
+            <a:ext cx="8520600" cy="3416400"/>
+          </a:xfrm>
+          <a:prstGeom prst="rect">
+            <a:avLst/>
+          </a:prstGeom>
+        </p:spPr>
+        <p:txBody>
+          <a:bodyPr anchorCtr="0" anchor="t" bIns="91425" lIns="91425" spcFirstLastPara="1" rIns="91425" wrap="square" tIns="91425">
+            <a:normAutofit/>
+          </a:bodyPr>
+          <a:lstStyle/>
+          <a:p>
+            <a:pPr indent="-342900" lvl="0" marL="457200" rtl="0" algn="l">
+              <a:spcBef>
+                <a:spcPts val="0"/>
+              </a:spcBef>
+              <a:spcAft>
+                <a:spcPts val="0"/>
+              </a:spcAft>
+              <a:buSzPts val="1800"/>
+              <a:buChar char="-"/>
+            </a:pPr>
+            <a:r>
+              <a:rPr lang="en"/>
+              <a:t>Now there are some tests in our repository</a:t>
+            </a:r>
+            <a:endParaRPr/>
+          </a:p>
+          <a:p>
+            <a:pPr indent="-342900" lvl="0" marL="457200" rtl="0" algn="l">
+              <a:spcBef>
+                <a:spcPts val="0"/>
+              </a:spcBef>
+              <a:spcAft>
+                <a:spcPts val="0"/>
+              </a:spcAft>
+              <a:buSzPts val="1800"/>
+              <a:buChar char="-"/>
+            </a:pPr>
+            <a:r>
+              <a:rPr lang="en"/>
+              <a:t>Run them when certain events occur in the repository</a:t>
+            </a:r>
+            <a:endParaRPr/>
+          </a:p>
+          <a:p>
+            <a:pPr indent="-342900" lvl="0" marL="457200" rtl="0" algn="l">
+              <a:spcBef>
+                <a:spcPts val="0"/>
+              </a:spcBef>
+              <a:spcAft>
+                <a:spcPts val="0"/>
+              </a:spcAft>
+              <a:buSzPts val="1800"/>
+              <a:buChar char="-"/>
+            </a:pPr>
+            <a:r>
+              <a:rPr lang="en"/>
+              <a:t>merge branch </a:t>
+            </a:r>
+            <a:r>
+              <a:rPr lang="en" u="sng">
+                <a:solidFill>
+                  <a:schemeClr val="hlink"/>
+                </a:solidFill>
+                <a:hlinkClick r:id="rId3"/>
+              </a:rPr>
+              <a:t>bmaden-usds/run-tests</a:t>
+            </a:r>
+            <a:endParaRPr/>
+          </a:p>
+          <a:p>
+            <a:pPr indent="-317500" lvl="1" marL="914400" rtl="0" algn="l">
+              <a:spcBef>
+                <a:spcPts val="0"/>
+              </a:spcBef>
+              <a:spcAft>
+                <a:spcPts val="0"/>
+              </a:spcAft>
+              <a:buSzPts val="1400"/>
+              <a:buChar char="-"/>
+            </a:pPr>
+            <a:r>
+              <a:rPr lang="en"/>
+              <a:t>This was done at the end of session 1</a:t>
+            </a:r>
+            <a:endParaRPr/>
+          </a:p>
+          <a:p>
+            <a:pPr indent="-342900" lvl="0" marL="457200" rtl="0" algn="l">
+              <a:spcBef>
+                <a:spcPts val="0"/>
+              </a:spcBef>
+              <a:spcAft>
+                <a:spcPts val="0"/>
+              </a:spcAft>
+              <a:buSzPts val="1800"/>
+              <a:buChar char="-"/>
+            </a:pPr>
+            <a:r>
+              <a:rPr lang="en" u="sng">
+                <a:solidFill>
+                  <a:schemeClr val="hlink"/>
+                </a:solidFill>
+                <a:hlinkClick r:id="rId4"/>
+              </a:rPr>
+              <a:t>Workflow syntax for GitHub Actions</a:t>
+            </a:r>
+            <a:endParaRPr/>
+          </a:p>
+          <a:p>
+            <a:pPr indent="-342900" lvl="0" marL="457200" rtl="0" algn="l">
+              <a:spcBef>
+                <a:spcPts val="0"/>
+              </a:spcBef>
+              <a:spcAft>
+                <a:spcPts val="0"/>
+              </a:spcAft>
+              <a:buSzPts val="1800"/>
+              <a:buChar char="-"/>
+            </a:pPr>
+            <a:r>
+              <a:rPr lang="en"/>
+              <a:t>Example: </a:t>
+            </a:r>
+            <a:r>
+              <a:rPr lang="en" u="sng">
+                <a:solidFill>
+                  <a:schemeClr val="hlink"/>
+                </a:solidFill>
+                <a:hlinkClick r:id="rId5"/>
+              </a:rPr>
+              <a:t>Run NBS tests</a:t>
+            </a:r>
+            <a:endParaRPr/>
+          </a:p>
+        </p:txBody>
+      </p:sp>
+    </p:spTree>
+  </p:cSld>
+  <p:clrMapOvr>
+    <a:masterClrMapping/>
+  </p:clrMapOvr>
+</p:sld>
+</file>
+
+<file path=ppt/slides/slide15.xml><?xml version="1.0" encoding="utf-8"?>
+<p:sld xmlns:a="http://schemas.openxmlformats.org/drawingml/2006/main" xmlns:r="http://schemas.openxmlformats.org/officeDocument/2006/relationships" xmlns:mc="http://schemas.openxmlformats.org/markup-compatibility/2006" xmlns:mv="urn:schemas-microsoft-com:mac:vml" xmlns:p="http://schemas.openxmlformats.org/presentationml/2006/main" xmlns:c="http://schemas.openxmlformats.org/drawingml/2006/chart" xmlns:dgm="http://schemas.openxmlformats.org/drawingml/2006/diagram" xmlns:o="urn:schemas-microsoft-com:office:office" xmlns:v="urn:schemas-microsoft-com:vml" xmlns:pvml="urn:schemas-microsoft-com:office:powerpoint" xmlns:com="http://schemas.openxmlformats.org/drawingml/2006/compatibility" xmlns:p14="http://schemas.microsoft.com/office/powerpoint/2010/main" xmlns:p15="http://schemas.microsoft.com/office/powerpoint/2012/main" xmlns:ahyp="http://schemas.microsoft.com/office/drawing/2018/hyperlinkcolor">
+  <p:cSld>
+    <p:spTree>
+      <p:nvGrpSpPr>
+        <p:cNvPr id="136" name="Shape 136"/>
+        <p:cNvGrpSpPr/>
+        <p:nvPr/>
+      </p:nvGrpSpPr>
+      <p:grpSpPr>
+        <a:xfrm>
+          <a:off x="0" y="0"/>
+          <a:ext cx="0" cy="0"/>
+          <a:chOff x="0" y="0"/>
+          <a:chExt cx="0" cy="0"/>
+        </a:xfrm>
+      </p:grpSpPr>
+      <p:sp>
+        <p:nvSpPr>
+          <p:cNvPr id="137" name="Google Shape;137;p27"/>
+          <p:cNvSpPr txBox="1"/>
+          <p:nvPr>
+            <p:ph type="title"/>
+          </p:nvPr>
+        </p:nvSpPr>
+        <p:spPr>
+          <a:xfrm>
+            <a:off x="311700" y="445025"/>
+            <a:ext cx="8520600" cy="572700"/>
+          </a:xfrm>
+          <a:prstGeom prst="rect">
+            <a:avLst/>
+          </a:prstGeom>
+        </p:spPr>
+        <p:txBody>
+          <a:bodyPr anchorCtr="0" anchor="t" bIns="91425" lIns="91425" spcFirstLastPara="1" rIns="91425" wrap="square" tIns="91425">
+            <a:normAutofit fontScale="90000"/>
+          </a:bodyPr>
+          <a:lstStyle/>
+          <a:p>
+            <a:pPr indent="0" lvl="0" marL="0" rtl="0" algn="l">
+              <a:spcBef>
+                <a:spcPts val="0"/>
+              </a:spcBef>
+              <a:spcAft>
+                <a:spcPts val="0"/>
+              </a:spcAft>
+              <a:buNone/>
+            </a:pPr>
+            <a:r>
+              <a:rPr lang="en"/>
+              <a:t>Dependency vulnerability scanning</a:t>
+            </a:r>
+            <a:endParaRPr/>
+          </a:p>
+        </p:txBody>
+      </p:sp>
+      <p:sp>
+        <p:nvSpPr>
+          <p:cNvPr id="138" name="Google Shape;138;p27"/>
+          <p:cNvSpPr txBox="1"/>
+          <p:nvPr>
+            <p:ph idx="1" type="body"/>
+          </p:nvPr>
+        </p:nvSpPr>
+        <p:spPr>
+          <a:xfrm>
+            <a:off x="311700" y="1152475"/>
+            <a:ext cx="8520600" cy="3416400"/>
+          </a:xfrm>
+          <a:prstGeom prst="rect">
+            <a:avLst/>
+          </a:prstGeom>
+        </p:spPr>
+        <p:txBody>
+          <a:bodyPr anchorCtr="0" anchor="t" bIns="91425" lIns="91425" spcFirstLastPara="1" rIns="91425" wrap="square" tIns="91425">
+            <a:normAutofit/>
+          </a:bodyPr>
+          <a:lstStyle/>
+          <a:p>
+            <a:pPr indent="-342900" lvl="0" marL="457200" rtl="0" algn="l">
+              <a:spcBef>
+                <a:spcPts val="0"/>
+              </a:spcBef>
+              <a:spcAft>
+                <a:spcPts val="0"/>
+              </a:spcAft>
+              <a:buSzPts val="1800"/>
+              <a:buChar char="-"/>
+            </a:pPr>
+            <a:r>
+              <a:rPr lang="en"/>
+              <a:t>Enable Dependabot</a:t>
+            </a:r>
+            <a:endParaRPr/>
+          </a:p>
+          <a:p>
+            <a:pPr indent="-317500" lvl="1" marL="914400" rtl="0" algn="l">
+              <a:spcBef>
+                <a:spcPts val="0"/>
+              </a:spcBef>
+              <a:spcAft>
+                <a:spcPts val="0"/>
+              </a:spcAft>
+              <a:buSzPts val="1400"/>
+              <a:buChar char="-"/>
+            </a:pPr>
+            <a:r>
+              <a:rPr lang="en" u="sng">
+                <a:solidFill>
+                  <a:schemeClr val="hlink"/>
+                </a:solidFill>
+                <a:hlinkClick r:id="rId3"/>
+              </a:rPr>
+              <a:t>https://github.com/[user|org]/[repo]/settings/security_analysis</a:t>
+            </a:r>
+            <a:endParaRPr/>
+          </a:p>
+          <a:p>
+            <a:pPr indent="-342900" lvl="0" marL="457200" rtl="0" algn="l">
+              <a:spcBef>
+                <a:spcPts val="0"/>
+              </a:spcBef>
+              <a:spcAft>
+                <a:spcPts val="0"/>
+              </a:spcAft>
+              <a:buSzPts val="1800"/>
+              <a:buChar char="-"/>
+            </a:pPr>
+            <a:r>
+              <a:rPr lang="en"/>
+              <a:t>Add a github workflow that schedules it</a:t>
+            </a:r>
+            <a:endParaRPr/>
+          </a:p>
+          <a:p>
+            <a:pPr indent="-317500" lvl="1" marL="914400" rtl="0" algn="l">
+              <a:spcBef>
+                <a:spcPts val="0"/>
+              </a:spcBef>
+              <a:spcAft>
+                <a:spcPts val="0"/>
+              </a:spcAft>
+              <a:buSzPts val="1400"/>
+              <a:buChar char="-"/>
+            </a:pPr>
+            <a:r>
+              <a:rPr lang="en" u="sng">
+                <a:solidFill>
+                  <a:schemeClr val="hlink"/>
+                </a:solidFill>
+                <a:hlinkClick r:id="rId4"/>
+              </a:rPr>
+              <a:t>Pull request that sets schedule</a:t>
+            </a:r>
+            <a:endParaRPr/>
+          </a:p>
+          <a:p>
+            <a:pPr indent="0" lvl="0" marL="0" rtl="0" algn="l">
+              <a:spcBef>
+                <a:spcPts val="1200"/>
+              </a:spcBef>
+              <a:spcAft>
+                <a:spcPts val="0"/>
+              </a:spcAft>
+              <a:buNone/>
+            </a:pPr>
+            <a:r>
+              <a:t/>
+            </a:r>
+            <a:endParaRPr/>
+          </a:p>
+          <a:p>
+            <a:pPr indent="0" lvl="0" marL="0" rtl="0" algn="l">
+              <a:spcBef>
+                <a:spcPts val="1200"/>
+              </a:spcBef>
+              <a:spcAft>
+                <a:spcPts val="0"/>
+              </a:spcAft>
+              <a:buNone/>
+            </a:pPr>
+            <a:r>
+              <a:rPr lang="en"/>
+              <a:t>Example of a finding:</a:t>
+            </a:r>
+            <a:endParaRPr/>
+          </a:p>
+          <a:p>
+            <a:pPr indent="0" lvl="0" marL="0" rtl="0" algn="l">
+              <a:spcBef>
+                <a:spcPts val="1200"/>
+              </a:spcBef>
+              <a:spcAft>
+                <a:spcPts val="1200"/>
+              </a:spcAft>
+              <a:buNone/>
+            </a:pPr>
+            <a:r>
+              <a:rPr lang="en" u="sng">
+                <a:solidFill>
+                  <a:schemeClr val="hlink"/>
+                </a:solidFill>
+                <a:hlinkClick r:id="rId5"/>
+              </a:rPr>
+              <a:t>https://github.com/CDCgov/prime-reportstream/pull/5329</a:t>
+            </a:r>
+            <a:endParaRPr/>
+          </a:p>
+        </p:txBody>
+      </p:sp>
+    </p:spTree>
+  </p:cSld>
+  <p:clrMapOvr>
+    <a:masterClrMapping/>
+  </p:clrMapOvr>
+</p:sld>
+</file>
+
+<file path=ppt/slides/slide16.xml><?xml version="1.0" encoding="utf-8"?>
+<p:sld xmlns:a="http://schemas.openxmlformats.org/drawingml/2006/main" xmlns:r="http://schemas.openxmlformats.org/officeDocument/2006/relationships" xmlns:mc="http://schemas.openxmlformats.org/markup-compatibility/2006" xmlns:mv="urn:schemas-microsoft-com:mac:vml" xmlns:p="http://schemas.openxmlformats.org/presentationml/2006/main" xmlns:c="http://schemas.openxmlformats.org/drawingml/2006/chart" xmlns:dgm="http://schemas.openxmlformats.org/drawingml/2006/diagram" xmlns:o="urn:schemas-microsoft-com:office:office" xmlns:v="urn:schemas-microsoft-com:vml" xmlns:pvml="urn:schemas-microsoft-com:office:powerpoint" xmlns:com="http://schemas.openxmlformats.org/drawingml/2006/compatibility" xmlns:p14="http://schemas.microsoft.com/office/powerpoint/2010/main" xmlns:p15="http://schemas.microsoft.com/office/powerpoint/2012/main" xmlns:ahyp="http://schemas.microsoft.com/office/drawing/2018/hyperlinkcolor">
+  <p:cSld>
+    <p:spTree>
+      <p:nvGrpSpPr>
+        <p:cNvPr id="142" name="Shape 142"/>
+        <p:cNvGrpSpPr/>
+        <p:nvPr/>
+      </p:nvGrpSpPr>
+      <p:grpSpPr>
+        <a:xfrm>
+          <a:off x="0" y="0"/>
+          <a:ext cx="0" cy="0"/>
+          <a:chOff x="0" y="0"/>
+          <a:chExt cx="0" cy="0"/>
+        </a:xfrm>
+      </p:grpSpPr>
+      <p:sp>
+        <p:nvSpPr>
+          <p:cNvPr id="143" name="Google Shape;143;p28"/>
+          <p:cNvSpPr txBox="1"/>
+          <p:nvPr>
+            <p:ph type="title"/>
+          </p:nvPr>
+        </p:nvSpPr>
+        <p:spPr>
+          <a:xfrm>
+            <a:off x="311700" y="445025"/>
+            <a:ext cx="8520600" cy="572700"/>
+          </a:xfrm>
+          <a:prstGeom prst="rect">
+            <a:avLst/>
+          </a:prstGeom>
+        </p:spPr>
+        <p:txBody>
+          <a:bodyPr anchorCtr="0" anchor="t" bIns="91425" lIns="91425" spcFirstLastPara="1" rIns="91425" wrap="square" tIns="91425">
+            <a:normAutofit fontScale="90000"/>
+          </a:bodyPr>
+          <a:lstStyle/>
+          <a:p>
+            <a:pPr indent="0" lvl="0" marL="0" rtl="0" algn="l">
+              <a:spcBef>
+                <a:spcPts val="0"/>
+              </a:spcBef>
+              <a:spcAft>
+                <a:spcPts val="0"/>
+              </a:spcAft>
+              <a:buNone/>
+            </a:pPr>
+            <a:r>
+              <a:rPr lang="en"/>
+              <a:t>Reducing diffs</a:t>
+            </a:r>
+            <a:endParaRPr/>
+          </a:p>
+        </p:txBody>
+      </p:sp>
+      <p:sp>
+        <p:nvSpPr>
+          <p:cNvPr id="144" name="Google Shape;144;p28"/>
+          <p:cNvSpPr txBox="1"/>
+          <p:nvPr>
+            <p:ph idx="1" type="body"/>
+          </p:nvPr>
+        </p:nvSpPr>
+        <p:spPr>
+          <a:xfrm>
+            <a:off x="311700" y="1152475"/>
+            <a:ext cx="8520600" cy="3416400"/>
+          </a:xfrm>
+          <a:prstGeom prst="rect">
+            <a:avLst/>
+          </a:prstGeom>
+        </p:spPr>
+        <p:txBody>
+          <a:bodyPr anchorCtr="0" anchor="t" bIns="91425" lIns="91425" spcFirstLastPara="1" rIns="91425" wrap="square" tIns="91425">
+            <a:normAutofit/>
+          </a:bodyPr>
+          <a:lstStyle/>
+          <a:p>
+            <a:pPr indent="-342900" lvl="0" marL="457200" rtl="0" algn="l">
+              <a:spcBef>
+                <a:spcPts val="0"/>
+              </a:spcBef>
+              <a:spcAft>
+                <a:spcPts val="0"/>
+              </a:spcAft>
+              <a:buSzPts val="1800"/>
+              <a:buChar char="-"/>
+            </a:pPr>
+            <a:r>
+              <a:rPr lang="en"/>
+              <a:t>Formatting (for example) by using spotless</a:t>
+            </a:r>
+            <a:endParaRPr/>
+          </a:p>
+          <a:p>
+            <a:pPr indent="-342900" lvl="0" marL="457200" rtl="0" algn="l">
+              <a:spcBef>
+                <a:spcPts val="0"/>
+              </a:spcBef>
+              <a:spcAft>
+                <a:spcPts val="0"/>
+              </a:spcAft>
+              <a:buSzPts val="1800"/>
+              <a:buChar char="-"/>
+            </a:pPr>
+            <a:r>
+              <a:rPr lang="en"/>
+              <a:t>Then check formatting when pull requests occur</a:t>
+            </a:r>
+            <a:endParaRPr/>
+          </a:p>
+          <a:p>
+            <a:pPr indent="-342900" lvl="0" marL="457200" rtl="0" algn="l">
+              <a:spcBef>
+                <a:spcPts val="0"/>
+              </a:spcBef>
+              <a:spcAft>
+                <a:spcPts val="0"/>
+              </a:spcAft>
+              <a:buSzPts val="1800"/>
+              <a:buChar char="-"/>
+            </a:pPr>
+            <a:r>
+              <a:rPr lang="en"/>
+              <a:t>Merge branch </a:t>
+            </a:r>
+            <a:r>
+              <a:rPr lang="en" u="sng">
+                <a:solidFill>
+                  <a:schemeClr val="hlink"/>
+                </a:solidFill>
+                <a:hlinkClick r:id="rId3"/>
+              </a:rPr>
+              <a:t>bmaden-usds/add-spotless</a:t>
+            </a:r>
+            <a:endParaRPr/>
+          </a:p>
+          <a:p>
+            <a:pPr indent="-342900" lvl="0" marL="457200" rtl="0" algn="l">
+              <a:spcBef>
+                <a:spcPts val="0"/>
+              </a:spcBef>
+              <a:spcAft>
+                <a:spcPts val="0"/>
+              </a:spcAft>
+              <a:buSzPts val="1800"/>
+              <a:buChar char="-"/>
+            </a:pPr>
+            <a:r>
+              <a:rPr lang="en"/>
+              <a:t>Automate local check with a pre-commit hook</a:t>
+            </a:r>
+            <a:endParaRPr/>
+          </a:p>
+        </p:txBody>
+      </p:sp>
+    </p:spTree>
+  </p:cSld>
+  <p:clrMapOvr>
+    <a:masterClrMapping/>
+  </p:clrMapOvr>
+</p:sld>
+</file>
+
+<file path=ppt/slides/slide17.xml><?xml version="1.0" encoding="utf-8"?>
+<p:sld xmlns:a="http://schemas.openxmlformats.org/drawingml/2006/main" xmlns:r="http://schemas.openxmlformats.org/officeDocument/2006/relationships" xmlns:mc="http://schemas.openxmlformats.org/markup-compatibility/2006" xmlns:mv="urn:schemas-microsoft-com:mac:vml" xmlns:p="http://schemas.openxmlformats.org/presentationml/2006/main" xmlns:c="http://schemas.openxmlformats.org/drawingml/2006/chart" xmlns:dgm="http://schemas.openxmlformats.org/drawingml/2006/diagram" xmlns:o="urn:schemas-microsoft-com:office:office" xmlns:v="urn:schemas-microsoft-com:vml" xmlns:pvml="urn:schemas-microsoft-com:office:powerpoint" xmlns:com="http://schemas.openxmlformats.org/drawingml/2006/compatibility" xmlns:p14="http://schemas.microsoft.com/office/powerpoint/2010/main" xmlns:p15="http://schemas.microsoft.com/office/powerpoint/2012/main" xmlns:ahyp="http://schemas.microsoft.com/office/drawing/2018/hyperlinkcolor">
+  <p:cSld>
+    <p:spTree>
+      <p:nvGrpSpPr>
+        <p:cNvPr id="148" name="Shape 148"/>
+        <p:cNvGrpSpPr/>
+        <p:nvPr/>
+      </p:nvGrpSpPr>
+      <p:grpSpPr>
+        <a:xfrm>
+          <a:off x="0" y="0"/>
+          <a:ext cx="0" cy="0"/>
+          <a:chOff x="0" y="0"/>
+          <a:chExt cx="0" cy="0"/>
+        </a:xfrm>
+      </p:grpSpPr>
+      <p:sp>
+        <p:nvSpPr>
+          <p:cNvPr id="149" name="Google Shape;149;p29"/>
+          <p:cNvSpPr txBox="1"/>
+          <p:nvPr>
+            <p:ph type="title"/>
+          </p:nvPr>
+        </p:nvSpPr>
+        <p:spPr>
+          <a:xfrm>
+            <a:off x="311700" y="445025"/>
+            <a:ext cx="8520600" cy="572700"/>
+          </a:xfrm>
+          <a:prstGeom prst="rect">
+            <a:avLst/>
+          </a:prstGeom>
+        </p:spPr>
+        <p:txBody>
+          <a:bodyPr anchorCtr="0" anchor="t" bIns="91425" lIns="91425" spcFirstLastPara="1" rIns="91425" wrap="square" tIns="91425">
+            <a:normAutofit fontScale="90000"/>
+          </a:bodyPr>
+          <a:lstStyle/>
+          <a:p>
+            <a:pPr indent="0" lvl="0" marL="0" rtl="0" algn="l">
+              <a:spcBef>
+                <a:spcPts val="0"/>
+              </a:spcBef>
+              <a:spcAft>
+                <a:spcPts val="0"/>
+              </a:spcAft>
+              <a:buNone/>
+            </a:pPr>
+            <a:r>
+              <a:rPr lang="en"/>
+              <a:t>3rd-party integrations</a:t>
+            </a:r>
+            <a:endParaRPr/>
+          </a:p>
+        </p:txBody>
+      </p:sp>
+      <p:sp>
+        <p:nvSpPr>
+          <p:cNvPr id="150" name="Google Shape;150;p29"/>
+          <p:cNvSpPr txBox="1"/>
+          <p:nvPr>
+            <p:ph idx="1" type="body"/>
+          </p:nvPr>
+        </p:nvSpPr>
+        <p:spPr>
+          <a:xfrm>
+            <a:off x="311700" y="1152475"/>
+            <a:ext cx="8520600" cy="3416400"/>
+          </a:xfrm>
+          <a:prstGeom prst="rect">
+            <a:avLst/>
+          </a:prstGeom>
+        </p:spPr>
+        <p:txBody>
+          <a:bodyPr anchorCtr="0" anchor="t" bIns="91425" lIns="91425" spcFirstLastPara="1" rIns="91425" wrap="square" tIns="91425">
+            <a:normAutofit/>
+          </a:bodyPr>
+          <a:lstStyle/>
+          <a:p>
+            <a:pPr indent="-342900" lvl="0" marL="457200" rtl="0" algn="l">
+              <a:spcBef>
+                <a:spcPts val="0"/>
+              </a:spcBef>
+              <a:spcAft>
+                <a:spcPts val="0"/>
+              </a:spcAft>
+              <a:buSzPts val="1800"/>
+              <a:buChar char="-"/>
+            </a:pPr>
+            <a:r>
+              <a:rPr lang="en"/>
+              <a:t>SonarCloud (SAST)</a:t>
+            </a:r>
+            <a:endParaRPr/>
+          </a:p>
+          <a:p>
+            <a:pPr indent="-342900" lvl="0" marL="457200" rtl="0" algn="l">
+              <a:spcBef>
+                <a:spcPts val="0"/>
+              </a:spcBef>
+              <a:spcAft>
+                <a:spcPts val="0"/>
+              </a:spcAft>
+              <a:buSzPts val="1800"/>
+              <a:buChar char="-"/>
+            </a:pPr>
+            <a:r>
+              <a:rPr lang="en"/>
+              <a:t>Snyk (alternative to dependabot)</a:t>
+            </a:r>
+            <a:endParaRPr/>
+          </a:p>
+          <a:p>
+            <a:pPr indent="-342900" lvl="0" marL="457200" rtl="0" algn="l">
+              <a:spcBef>
+                <a:spcPts val="0"/>
+              </a:spcBef>
+              <a:spcAft>
+                <a:spcPts val="0"/>
+              </a:spcAft>
+              <a:buSzPts val="1800"/>
+              <a:buChar char="-"/>
+            </a:pPr>
+            <a:r>
+              <a:rPr lang="en"/>
+              <a:t>Jira</a:t>
+            </a:r>
+            <a:endParaRPr/>
+          </a:p>
+        </p:txBody>
+      </p:sp>
+    </p:spTree>
+  </p:cSld>
+  <p:clrMapOvr>
+    <a:masterClrMapping/>
+  </p:clrMapOvr>
+</p:sld>
+</file>
+
+<file path=ppt/slides/slide18.xml><?xml version="1.0" encoding="utf-8"?>
+<p:sld xmlns:a="http://schemas.openxmlformats.org/drawingml/2006/main" xmlns:r="http://schemas.openxmlformats.org/officeDocument/2006/relationships" xmlns:mc="http://schemas.openxmlformats.org/markup-compatibility/2006" xmlns:mv="urn:schemas-microsoft-com:mac:vml" xmlns:p="http://schemas.openxmlformats.org/presentationml/2006/main" xmlns:c="http://schemas.openxmlformats.org/drawingml/2006/chart" xmlns:dgm="http://schemas.openxmlformats.org/drawingml/2006/diagram" xmlns:o="urn:schemas-microsoft-com:office:office" xmlns:v="urn:schemas-microsoft-com:vml" xmlns:pvml="urn:schemas-microsoft-com:office:powerpoint" xmlns:com="http://schemas.openxmlformats.org/drawingml/2006/compatibility" xmlns:p14="http://schemas.microsoft.com/office/powerpoint/2010/main" xmlns:p15="http://schemas.microsoft.com/office/powerpoint/2012/main" xmlns:ahyp="http://schemas.microsoft.com/office/drawing/2018/hyperlinkcolor">
+  <p:cSld>
+    <p:spTree>
+      <p:nvGrpSpPr>
+        <p:cNvPr id="154" name="Shape 154"/>
+        <p:cNvGrpSpPr/>
+        <p:nvPr/>
+      </p:nvGrpSpPr>
+      <p:grpSpPr>
+        <a:xfrm>
+          <a:off x="0" y="0"/>
+          <a:ext cx="0" cy="0"/>
+          <a:chOff x="0" y="0"/>
+          <a:chExt cx="0" cy="0"/>
+        </a:xfrm>
+      </p:grpSpPr>
+      <p:sp>
+        <p:nvSpPr>
+          <p:cNvPr id="155" name="Google Shape;155;p30"/>
+          <p:cNvSpPr txBox="1"/>
+          <p:nvPr>
+            <p:ph type="title"/>
+          </p:nvPr>
+        </p:nvSpPr>
+        <p:spPr>
+          <a:xfrm>
+            <a:off x="311700" y="445025"/>
+            <a:ext cx="8520600" cy="572700"/>
+          </a:xfrm>
+          <a:prstGeom prst="rect">
+            <a:avLst/>
+          </a:prstGeom>
+        </p:spPr>
+        <p:txBody>
+          <a:bodyPr anchorCtr="0" anchor="t" bIns="91425" lIns="91425" spcFirstLastPara="1" rIns="91425" wrap="square" tIns="91425">
+            <a:normAutofit fontScale="90000"/>
+          </a:bodyPr>
+          <a:lstStyle/>
+          <a:p>
+            <a:pPr indent="0" lvl="0" marL="0" rtl="0" algn="l">
+              <a:spcBef>
+                <a:spcPts val="0"/>
+              </a:spcBef>
+              <a:spcAft>
+                <a:spcPts val="0"/>
+              </a:spcAft>
+              <a:buNone/>
+            </a:pPr>
+            <a:r>
+              <a:rPr lang="en"/>
+              <a:t>SonarCloud</a:t>
+            </a:r>
+            <a:endParaRPr/>
+          </a:p>
+        </p:txBody>
+      </p:sp>
+      <p:sp>
+        <p:nvSpPr>
+          <p:cNvPr id="156" name="Google Shape;156;p30"/>
+          <p:cNvSpPr txBox="1"/>
+          <p:nvPr>
+            <p:ph idx="1" type="body"/>
+          </p:nvPr>
+        </p:nvSpPr>
+        <p:spPr>
+          <a:xfrm>
+            <a:off x="311700" y="1152475"/>
+            <a:ext cx="8520600" cy="3416400"/>
+          </a:xfrm>
+          <a:prstGeom prst="rect">
+            <a:avLst/>
+          </a:prstGeom>
+        </p:spPr>
+        <p:txBody>
+          <a:bodyPr anchorCtr="0" anchor="t" bIns="91425" lIns="91425" spcFirstLastPara="1" rIns="91425" wrap="square" tIns="91425">
+            <a:normAutofit/>
+          </a:bodyPr>
+          <a:lstStyle/>
+          <a:p>
+            <a:pPr indent="-342900" lvl="0" marL="457200" rtl="0" algn="l">
+              <a:spcBef>
+                <a:spcPts val="0"/>
+              </a:spcBef>
+              <a:spcAft>
+                <a:spcPts val="0"/>
+              </a:spcAft>
+              <a:buSzPts val="1800"/>
+              <a:buChar char="-"/>
+            </a:pPr>
+            <a:r>
+              <a:rPr lang="en" u="sng">
+                <a:solidFill>
+                  <a:schemeClr val="hlink"/>
+                </a:solidFill>
+                <a:hlinkClick r:id="rId3"/>
+              </a:rPr>
+              <a:t>Sample project provided by Sonar</a:t>
+            </a:r>
+            <a:endParaRPr/>
+          </a:p>
+          <a:p>
+            <a:pPr indent="-317500" lvl="1" marL="914400" rtl="0" algn="l">
+              <a:spcBef>
+                <a:spcPts val="0"/>
+              </a:spcBef>
+              <a:spcAft>
+                <a:spcPts val="0"/>
+              </a:spcAft>
+              <a:buSzPts val="1400"/>
+              <a:buChar char="-"/>
+            </a:pPr>
+            <a:r>
+              <a:rPr lang="en"/>
+              <a:t>Includes a sample for a maven project</a:t>
+            </a:r>
+            <a:endParaRPr/>
+          </a:p>
+          <a:p>
+            <a:pPr indent="-342900" lvl="0" marL="457200" rtl="0" algn="l">
+              <a:spcBef>
+                <a:spcPts val="0"/>
+              </a:spcBef>
+              <a:spcAft>
+                <a:spcPts val="0"/>
+              </a:spcAft>
+              <a:buSzPts val="1800"/>
+              <a:buChar char="-"/>
+            </a:pPr>
+            <a:r>
+              <a:rPr lang="en"/>
+              <a:t>No functioning demo on this project</a:t>
+            </a:r>
+            <a:endParaRPr/>
+          </a:p>
+          <a:p>
+            <a:pPr indent="-317500" lvl="1" marL="914400" rtl="0" algn="l">
+              <a:spcBef>
+                <a:spcPts val="0"/>
+              </a:spcBef>
+              <a:spcAft>
+                <a:spcPts val="0"/>
+              </a:spcAft>
+              <a:buSzPts val="1400"/>
+              <a:buChar char="-"/>
+            </a:pPr>
+            <a:r>
+              <a:rPr lang="en"/>
+              <a:t>Integration with Github requires a Github Organization</a:t>
+            </a:r>
+            <a:endParaRPr/>
+          </a:p>
+          <a:p>
+            <a:pPr indent="-342900" lvl="0" marL="457200" rtl="0" algn="l">
+              <a:spcBef>
+                <a:spcPts val="0"/>
+              </a:spcBef>
+              <a:spcAft>
+                <a:spcPts val="0"/>
+              </a:spcAft>
+              <a:buSzPts val="1800"/>
+              <a:buChar char="-"/>
+            </a:pPr>
+            <a:r>
+              <a:rPr lang="en"/>
+              <a:t>Caveats</a:t>
+            </a:r>
+            <a:endParaRPr/>
+          </a:p>
+          <a:p>
+            <a:pPr indent="-317500" lvl="1" marL="914400" rtl="0" algn="l">
+              <a:spcBef>
+                <a:spcPts val="0"/>
+              </a:spcBef>
+              <a:spcAft>
+                <a:spcPts val="0"/>
+              </a:spcAft>
+              <a:buSzPts val="1400"/>
+              <a:buChar char="-"/>
+            </a:pPr>
+            <a:r>
+              <a:rPr lang="en"/>
+              <a:t>This particular service requires Java 11+</a:t>
             </a:r>
             <a:endParaRPr/>
           </a:p>
@@ -7587,7 +9177,7 @@
             <a:tbl>
               <a:tblPr>
                 <a:noFill/>
-                <a:tableStyleId>{5C046A3C-1326-4432-9DF6-67BB4F64849F}</a:tableStyleId>
+                <a:tableStyleId>{27CF5BE5-135A-4DCB-8E0E-F3163DC793CA}</a:tableStyleId>
               </a:tblPr>
               <a:tblGrid>
                 <a:gridCol w="3619500"/>
@@ -7657,10 +9247,20 @@
                         <a:buNone/>
                       </a:pPr>
                       <a:r>
-                        <a:rPr lang="en"/>
+                        <a:rPr lang="en">
+                          <a:latin typeface="Source Sans Pro"/>
+                          <a:ea typeface="Source Sans Pro"/>
+                          <a:cs typeface="Source Sans Pro"/>
+                          <a:sym typeface="Source Sans Pro"/>
+                        </a:rPr>
                         <a:t>checkout</a:t>
                       </a:r>
-                      <a:endParaRPr/>
+                      <a:endParaRPr>
+                        <a:latin typeface="Source Sans Pro"/>
+                        <a:ea typeface="Source Sans Pro"/>
+                        <a:cs typeface="Source Sans Pro"/>
+                        <a:sym typeface="Source Sans Pro"/>
+                      </a:endParaRPr>
                     </a:p>
                   </a:txBody>
                   <a:tcPr marT="91425" marB="91425" marR="91425" marL="91425"/>
@@ -7680,10 +9280,20 @@
                         <a:buNone/>
                       </a:pPr>
                       <a:r>
-                        <a:rPr lang="en"/>
+                        <a:rPr lang="en">
+                          <a:latin typeface="Source Sans Pro"/>
+                          <a:ea typeface="Source Sans Pro"/>
+                          <a:cs typeface="Source Sans Pro"/>
+                          <a:sym typeface="Source Sans Pro"/>
+                        </a:rPr>
                         <a:t>clone</a:t>
                       </a:r>
-                      <a:endParaRPr/>
+                      <a:endParaRPr>
+                        <a:latin typeface="Source Sans Pro"/>
+                        <a:ea typeface="Source Sans Pro"/>
+                        <a:cs typeface="Source Sans Pro"/>
+                        <a:sym typeface="Source Sans Pro"/>
+                      </a:endParaRPr>
                     </a:p>
                   </a:txBody>
                   <a:tcPr marT="91425" marB="91425" marR="91425" marL="91425"/>
@@ -7705,10 +9315,20 @@
                         <a:buNone/>
                       </a:pPr>
                       <a:r>
-                        <a:rPr lang="en"/>
+                        <a:rPr lang="en">
+                          <a:latin typeface="Source Sans Pro"/>
+                          <a:ea typeface="Source Sans Pro"/>
+                          <a:cs typeface="Source Sans Pro"/>
+                          <a:sym typeface="Source Sans Pro"/>
+                        </a:rPr>
                         <a:t>update</a:t>
                       </a:r>
-                      <a:endParaRPr/>
+                      <a:endParaRPr>
+                        <a:latin typeface="Source Sans Pro"/>
+                        <a:ea typeface="Source Sans Pro"/>
+                        <a:cs typeface="Source Sans Pro"/>
+                        <a:sym typeface="Source Sans Pro"/>
+                      </a:endParaRPr>
                     </a:p>
                   </a:txBody>
                   <a:tcPr marT="91425" marB="91425" marR="91425" marL="91425"/>
@@ -7728,10 +9348,20 @@
                         <a:buNone/>
                       </a:pPr>
                       <a:r>
-                        <a:rPr lang="en"/>
+                        <a:rPr lang="en">
+                          <a:latin typeface="Source Sans Pro"/>
+                          <a:ea typeface="Source Sans Pro"/>
+                          <a:cs typeface="Source Sans Pro"/>
+                          <a:sym typeface="Source Sans Pro"/>
+                        </a:rPr>
                         <a:t>fetch/pull</a:t>
                       </a:r>
-                      <a:endParaRPr/>
+                      <a:endParaRPr>
+                        <a:latin typeface="Source Sans Pro"/>
+                        <a:ea typeface="Source Sans Pro"/>
+                        <a:cs typeface="Source Sans Pro"/>
+                        <a:sym typeface="Source Sans Pro"/>
+                      </a:endParaRPr>
                     </a:p>
                   </a:txBody>
                   <a:tcPr marT="91425" marB="91425" marR="91425" marL="91425"/>
@@ -7753,10 +9383,20 @@
                         <a:buNone/>
                       </a:pPr>
                       <a:r>
-                        <a:rPr lang="en"/>
+                        <a:rPr lang="en">
+                          <a:latin typeface="Source Sans Pro"/>
+                          <a:ea typeface="Source Sans Pro"/>
+                          <a:cs typeface="Source Sans Pro"/>
+                          <a:sym typeface="Source Sans Pro"/>
+                        </a:rPr>
                         <a:t>commit</a:t>
                       </a:r>
-                      <a:endParaRPr/>
+                      <a:endParaRPr>
+                        <a:latin typeface="Source Sans Pro"/>
+                        <a:ea typeface="Source Sans Pro"/>
+                        <a:cs typeface="Source Sans Pro"/>
+                        <a:sym typeface="Source Sans Pro"/>
+                      </a:endParaRPr>
                     </a:p>
                   </a:txBody>
                   <a:tcPr marT="91425" marB="91425" marR="91425" marL="91425"/>
@@ -7776,10 +9416,20 @@
                         <a:buNone/>
                       </a:pPr>
                       <a:r>
-                        <a:rPr lang="en"/>
+                        <a:rPr lang="en">
+                          <a:latin typeface="Source Sans Pro"/>
+                          <a:ea typeface="Source Sans Pro"/>
+                          <a:cs typeface="Source Sans Pro"/>
+                          <a:sym typeface="Source Sans Pro"/>
+                        </a:rPr>
                         <a:t>commit</a:t>
                       </a:r>
-                      <a:endParaRPr/>
+                      <a:endParaRPr>
+                        <a:latin typeface="Source Sans Pro"/>
+                        <a:ea typeface="Source Sans Pro"/>
+                        <a:cs typeface="Source Sans Pro"/>
+                        <a:sym typeface="Source Sans Pro"/>
+                      </a:endParaRPr>
                     </a:p>
                   </a:txBody>
                   <a:tcPr marT="91425" marB="91425" marR="91425" marL="91425"/>
@@ -7801,10 +9451,20 @@
                         <a:buNone/>
                       </a:pPr>
                       <a:r>
-                        <a:rPr lang="en"/>
+                        <a:rPr lang="en">
+                          <a:latin typeface="Source Sans Pro"/>
+                          <a:ea typeface="Source Sans Pro"/>
+                          <a:cs typeface="Source Sans Pro"/>
+                          <a:sym typeface="Source Sans Pro"/>
+                        </a:rPr>
                         <a:t>copy</a:t>
                       </a:r>
-                      <a:endParaRPr/>
+                      <a:endParaRPr>
+                        <a:latin typeface="Source Sans Pro"/>
+                        <a:ea typeface="Source Sans Pro"/>
+                        <a:cs typeface="Source Sans Pro"/>
+                        <a:sym typeface="Source Sans Pro"/>
+                      </a:endParaRPr>
                     </a:p>
                   </a:txBody>
                   <a:tcPr marT="91425" marB="91425" marR="91425" marL="91425"/>
@@ -7824,10 +9484,20 @@
                         <a:buNone/>
                       </a:pPr>
                       <a:r>
-                        <a:rPr lang="en"/>
+                        <a:rPr lang="en">
+                          <a:latin typeface="Source Sans Pro"/>
+                          <a:ea typeface="Source Sans Pro"/>
+                          <a:cs typeface="Source Sans Pro"/>
+                          <a:sym typeface="Source Sans Pro"/>
+                        </a:rPr>
                         <a:t>branch/tag</a:t>
                       </a:r>
-                      <a:endParaRPr/>
+                      <a:endParaRPr>
+                        <a:latin typeface="Source Sans Pro"/>
+                        <a:ea typeface="Source Sans Pro"/>
+                        <a:cs typeface="Source Sans Pro"/>
+                        <a:sym typeface="Source Sans Pro"/>
+                      </a:endParaRPr>
                     </a:p>
                   </a:txBody>
                   <a:tcPr marT="91425" marB="91425" marR="91425" marL="91425"/>
@@ -7849,10 +9519,20 @@
                         <a:buNone/>
                       </a:pPr>
                       <a:r>
-                        <a:rPr lang="en"/>
+                        <a:rPr lang="en">
+                          <a:latin typeface="Source Sans Pro"/>
+                          <a:ea typeface="Source Sans Pro"/>
+                          <a:cs typeface="Source Sans Pro"/>
+                          <a:sym typeface="Source Sans Pro"/>
+                        </a:rPr>
                         <a:t>switch</a:t>
                       </a:r>
-                      <a:endParaRPr/>
+                      <a:endParaRPr>
+                        <a:latin typeface="Source Sans Pro"/>
+                        <a:ea typeface="Source Sans Pro"/>
+                        <a:cs typeface="Source Sans Pro"/>
+                        <a:sym typeface="Source Sans Pro"/>
+                      </a:endParaRPr>
                     </a:p>
                   </a:txBody>
                   <a:tcPr marT="91425" marB="91425" marR="91425" marL="91425"/>
@@ -7872,10 +9552,20 @@
                         <a:buNone/>
                       </a:pPr>
                       <a:r>
-                        <a:rPr lang="en"/>
+                        <a:rPr lang="en">
+                          <a:latin typeface="Source Sans Pro"/>
+                          <a:ea typeface="Source Sans Pro"/>
+                          <a:cs typeface="Source Sans Pro"/>
+                          <a:sym typeface="Source Sans Pro"/>
+                        </a:rPr>
                         <a:t>switch/checkout</a:t>
                       </a:r>
-                      <a:endParaRPr/>
+                      <a:endParaRPr>
+                        <a:latin typeface="Source Sans Pro"/>
+                        <a:ea typeface="Source Sans Pro"/>
+                        <a:cs typeface="Source Sans Pro"/>
+                        <a:sym typeface="Source Sans Pro"/>
+                      </a:endParaRPr>
                     </a:p>
                   </a:txBody>
                   <a:tcPr marT="91425" marB="91425" marR="91425" marL="91425"/>
@@ -7897,10 +9587,20 @@
                         <a:buNone/>
                       </a:pPr>
                       <a:r>
-                        <a:rPr lang="en"/>
+                        <a:rPr lang="en">
+                          <a:latin typeface="Source Sans Pro"/>
+                          <a:ea typeface="Source Sans Pro"/>
+                          <a:cs typeface="Source Sans Pro"/>
+                          <a:sym typeface="Source Sans Pro"/>
+                        </a:rPr>
                         <a:t>revert</a:t>
                       </a:r>
-                      <a:endParaRPr/>
+                      <a:endParaRPr>
+                        <a:latin typeface="Source Sans Pro"/>
+                        <a:ea typeface="Source Sans Pro"/>
+                        <a:cs typeface="Source Sans Pro"/>
+                        <a:sym typeface="Source Sans Pro"/>
+                      </a:endParaRPr>
                     </a:p>
                   </a:txBody>
                   <a:tcPr marT="91425" marB="91425" marR="91425" marL="91425"/>
@@ -7920,10 +9620,20 @@
                         <a:buNone/>
                       </a:pPr>
                       <a:r>
-                        <a:rPr lang="en"/>
+                        <a:rPr lang="en">
+                          <a:latin typeface="Source Sans Pro"/>
+                          <a:ea typeface="Source Sans Pro"/>
+                          <a:cs typeface="Source Sans Pro"/>
+                          <a:sym typeface="Source Sans Pro"/>
+                        </a:rPr>
                         <a:t>restore/checkout</a:t>
                       </a:r>
-                      <a:endParaRPr/>
+                      <a:endParaRPr>
+                        <a:latin typeface="Source Sans Pro"/>
+                        <a:ea typeface="Source Sans Pro"/>
+                        <a:cs typeface="Source Sans Pro"/>
+                        <a:sym typeface="Source Sans Pro"/>
+                      </a:endParaRPr>
                     </a:p>
                   </a:txBody>
                   <a:tcPr marT="91425" marB="91425" marR="91425" marL="91425"/>
@@ -7933,6 +9643,62 @@
           </a:graphicData>
         </a:graphic>
       </p:graphicFrame>
+      <p:sp>
+        <p:nvSpPr>
+          <p:cNvPr id="68" name="Google Shape;68;p15"/>
+          <p:cNvSpPr txBox="1"/>
+          <p:nvPr/>
+        </p:nvSpPr>
+        <p:spPr>
+          <a:xfrm>
+            <a:off x="772725" y="4419800"/>
+            <a:ext cx="7059900" cy="400200"/>
+          </a:xfrm>
+          <a:prstGeom prst="rect">
+            <a:avLst/>
+          </a:prstGeom>
+          <a:noFill/>
+          <a:ln>
+            <a:noFill/>
+          </a:ln>
+        </p:spPr>
+        <p:txBody>
+          <a:bodyPr anchorCtr="0" anchor="t" bIns="91425" lIns="91425" spcFirstLastPara="1" rIns="91425" wrap="square" tIns="91425">
+            <a:spAutoFit/>
+          </a:bodyPr>
+          <a:lstStyle/>
+          <a:p>
+            <a:pPr indent="0" lvl="0" marL="0" rtl="0" algn="l">
+              <a:spcBef>
+                <a:spcPts val="0"/>
+              </a:spcBef>
+              <a:spcAft>
+                <a:spcPts val="0"/>
+              </a:spcAft>
+              <a:buNone/>
+            </a:pPr>
+            <a:r>
+              <a:rPr lang="en" u="sng">
+                <a:solidFill>
+                  <a:schemeClr val="hlink"/>
+                </a:solidFill>
+                <a:latin typeface="Merriweather"/>
+                <a:ea typeface="Merriweather"/>
+                <a:cs typeface="Merriweather"/>
+                <a:sym typeface="Merriweather"/>
+                <a:hlinkClick r:id="rId3"/>
+              </a:rPr>
+              <a:t>Interesting podcast from co-creator of svn about rcs -&gt; cvs -&gt; svn -&gt; git</a:t>
+            </a:r>
+            <a:endParaRPr>
+              <a:latin typeface="Merriweather"/>
+              <a:ea typeface="Merriweather"/>
+              <a:cs typeface="Merriweather"/>
+              <a:sym typeface="Merriweather"/>
+            </a:endParaRPr>
+          </a:p>
+        </p:txBody>
+      </p:sp>
     </p:spTree>
   </p:cSld>
   <p:clrMapOvr>
@@ -7946,7 +9712,7 @@
   <p:cSld>
     <p:spTree>
       <p:nvGrpSpPr>
-        <p:cNvPr id="71" name="Shape 71"/>
+        <p:cNvPr id="72" name="Shape 72"/>
         <p:cNvGrpSpPr/>
         <p:nvPr/>
       </p:nvGrpSpPr>
@@ -7960,7 +9726,7 @@
       </p:grpSpPr>
       <p:sp>
         <p:nvSpPr>
-          <p:cNvPr id="72" name="Google Shape;72;p16"/>
+          <p:cNvPr id="73" name="Google Shape;73;p16"/>
           <p:cNvSpPr txBox="1"/>
           <p:nvPr>
             <p:ph type="title"/>
@@ -8000,7 +9766,7 @@
       </p:sp>
       <p:sp>
         <p:nvSpPr>
-          <p:cNvPr id="73" name="Google Shape;73;p16"/>
+          <p:cNvPr id="74" name="Google Shape;74;p16"/>
           <p:cNvSpPr txBox="1"/>
           <p:nvPr>
             <p:ph idx="1" type="body"/>
@@ -8103,7 +9869,7 @@
   <p:cSld>
     <p:spTree>
       <p:nvGrpSpPr>
-        <p:cNvPr id="77" name="Shape 77"/>
+        <p:cNvPr id="78" name="Shape 78"/>
         <p:cNvGrpSpPr/>
         <p:nvPr/>
       </p:nvGrpSpPr>
@@ -8117,7 +9883,7 @@
       </p:grpSpPr>
       <p:pic>
         <p:nvPicPr>
-          <p:cNvPr id="78" name="Google Shape;78;p17"/>
+          <p:cNvPr id="79" name="Google Shape;79;p17"/>
           <p:cNvPicPr preferRelativeResize="0"/>
           <p:nvPr/>
         </p:nvPicPr>
@@ -8145,7 +9911,7 @@
       </p:pic>
       <p:sp>
         <p:nvSpPr>
-          <p:cNvPr id="79" name="Google Shape;79;p17"/>
+          <p:cNvPr id="80" name="Google Shape;80;p17"/>
           <p:cNvSpPr txBox="1"/>
           <p:nvPr/>
         </p:nvSpPr>
@@ -8203,7 +9969,7 @@
   <p:cSld>
     <p:spTree>
       <p:nvGrpSpPr>
-        <p:cNvPr id="83" name="Shape 83"/>
+        <p:cNvPr id="84" name="Shape 84"/>
         <p:cNvGrpSpPr/>
         <p:nvPr/>
       </p:nvGrpSpPr>
@@ -8217,7 +9983,7 @@
       </p:grpSpPr>
       <p:sp>
         <p:nvSpPr>
-          <p:cNvPr id="84" name="Google Shape;84;p18"/>
+          <p:cNvPr id="85" name="Google Shape;85;p18"/>
           <p:cNvSpPr txBox="1"/>
           <p:nvPr>
             <p:ph type="title"/>
@@ -8268,7 +10034,7 @@
   <p:cSld>
     <p:spTree>
       <p:nvGrpSpPr>
-        <p:cNvPr id="88" name="Shape 88"/>
+        <p:cNvPr id="89" name="Shape 89"/>
         <p:cNvGrpSpPr/>
         <p:nvPr/>
       </p:nvGrpSpPr>
@@ -8282,7 +10048,7 @@
       </p:grpSpPr>
       <p:sp>
         <p:nvSpPr>
-          <p:cNvPr id="89" name="Google Shape;89;p19"/>
+          <p:cNvPr id="90" name="Google Shape;90;p19"/>
           <p:cNvSpPr txBox="1"/>
           <p:nvPr>
             <p:ph type="title"/>
@@ -8322,7 +10088,7 @@
       </p:sp>
       <p:sp>
         <p:nvSpPr>
-          <p:cNvPr id="90" name="Google Shape;90;p19"/>
+          <p:cNvPr id="91" name="Google Shape;91;p19"/>
           <p:cNvSpPr txBox="1"/>
           <p:nvPr>
             <p:ph idx="1" type="body"/>
@@ -8379,7 +10145,7 @@
   <p:cSld>
     <p:spTree>
       <p:nvGrpSpPr>
-        <p:cNvPr id="94" name="Shape 94"/>
+        <p:cNvPr id="95" name="Shape 95"/>
         <p:cNvGrpSpPr/>
         <p:nvPr/>
       </p:nvGrpSpPr>
@@ -8393,7 +10159,7 @@
       </p:grpSpPr>
       <p:sp>
         <p:nvSpPr>
-          <p:cNvPr id="95" name="Google Shape;95;p20"/>
+          <p:cNvPr id="96" name="Google Shape;96;p20"/>
           <p:cNvSpPr txBox="1"/>
           <p:nvPr>
             <p:ph type="title"/>
@@ -8433,7 +10199,7 @@
       </p:sp>
       <p:sp>
         <p:nvSpPr>
-          <p:cNvPr id="96" name="Google Shape;96;p20"/>
+          <p:cNvPr id="97" name="Google Shape;97;p20"/>
           <p:cNvSpPr txBox="1"/>
           <p:nvPr>
             <p:ph idx="1" type="body"/>
@@ -8502,7 +10268,7 @@
   <p:cSld>
     <p:spTree>
       <p:nvGrpSpPr>
-        <p:cNvPr id="100" name="Shape 100"/>
+        <p:cNvPr id="101" name="Shape 101"/>
         <p:cNvGrpSpPr/>
         <p:nvPr/>
       </p:nvGrpSpPr>
@@ -8516,7 +10282,7 @@
       </p:grpSpPr>
       <p:sp>
         <p:nvSpPr>
-          <p:cNvPr id="101" name="Google Shape;101;p21"/>
+          <p:cNvPr id="102" name="Google Shape;102;p21"/>
           <p:cNvSpPr txBox="1"/>
           <p:nvPr>
             <p:ph type="title"/>
@@ -8556,7 +10322,7 @@
       </p:sp>
       <p:sp>
         <p:nvSpPr>
-          <p:cNvPr id="102" name="Google Shape;102;p21"/>
+          <p:cNvPr id="103" name="Google Shape;103;p21"/>
           <p:cNvSpPr txBox="1"/>
           <p:nvPr>
             <p:ph idx="1" type="body"/>
@@ -8605,6 +10371,23 @@
               <a:buChar char="-"/>
             </a:pPr>
             <a:r>
+              <a:rPr lang="en"/>
+              <a:t>Create documents anywhere in the repository (for example, try "README.md" in the root of the repository) and they will be rendered as html when viewed on github.com</a:t>
+            </a:r>
+            <a:endParaRPr/>
+          </a:p>
+          <a:p>
+            <a:pPr indent="-342900" lvl="0" marL="457200" rtl="0" algn="l">
+              <a:spcBef>
+                <a:spcPts val="0"/>
+              </a:spcBef>
+              <a:spcAft>
+                <a:spcPts val="0"/>
+              </a:spcAft>
+              <a:buSzPts val="1800"/>
+              <a:buChar char="-"/>
+            </a:pPr>
+            <a:r>
               <a:rPr lang="en" u="sng">
                 <a:solidFill>
                   <a:schemeClr val="hlink"/>
@@ -8626,6 +10409,285 @@
 </file>
 
 <file path=ppt/theme/theme1.xml><?xml version="1.0" encoding="utf-8"?>
+<a:theme xmlns:a="http://schemas.openxmlformats.org/drawingml/2006/main" xmlns:r="http://schemas.openxmlformats.org/officeDocument/2006/relationships" name="Simple Light">
+  <a:themeElements>
+    <a:clrScheme name="Simple Light">
+      <a:dk1>
+        <a:srgbClr val="000000"/>
+      </a:dk1>
+      <a:lt1>
+        <a:srgbClr val="FFFFFF"/>
+      </a:lt1>
+      <a:dk2>
+        <a:srgbClr val="595959"/>
+      </a:dk2>
+      <a:lt2>
+        <a:srgbClr val="EEEEEE"/>
+      </a:lt2>
+      <a:accent1>
+        <a:srgbClr val="4285F4"/>
+      </a:accent1>
+      <a:accent2>
+        <a:srgbClr val="212121"/>
+      </a:accent2>
+      <a:accent3>
+        <a:srgbClr val="78909C"/>
+      </a:accent3>
+      <a:accent4>
+        <a:srgbClr val="FFAB40"/>
+      </a:accent4>
+      <a:accent5>
+        <a:srgbClr val="0097A7"/>
+      </a:accent5>
+      <a:accent6>
+        <a:srgbClr val="EEFF41"/>
+      </a:accent6>
+      <a:hlink>
+        <a:srgbClr val="0097A7"/>
+      </a:hlink>
+      <a:folHlink>
+        <a:srgbClr val="0097A7"/>
+      </a:folHlink>
+    </a:clrScheme>
+    <a:fontScheme name="Office">
+      <a:majorFont>
+        <a:latin typeface="Arial"/>
+        <a:ea typeface=""/>
+        <a:cs typeface=""/>
+        <a:font script="Jpan" typeface="ＭＳ Ｐゴシック"/>
+        <a:font script="Hang" typeface="맑은 고딕"/>
+        <a:font script="Hans" typeface="宋体"/>
+        <a:font script="Hant" typeface="新細明體"/>
+        <a:font script="Arab" typeface="Times New Roman"/>
+        <a:font script="Hebr" typeface="Times New Roman"/>
+        <a:font script="Thai" typeface="Angsana New"/>
+        <a:font script="Ethi" typeface="Nyala"/>
+        <a:font script="Beng" typeface="Vrinda"/>
+        <a:font script="Gujr" typeface="Shruti"/>
+        <a:font script="Khmr" typeface="MoolBoran"/>
+        <a:font script="Knda" typeface="Tunga"/>
+        <a:font script="Guru" typeface="Raavi"/>
+        <a:font script="Cans" typeface="Euphemia"/>
+        <a:font script="Cher" typeface="Plantagenet Cherokee"/>
+        <a:font script="Yiii" typeface="Microsoft Yi Baiti"/>
+        <a:font script="Tibt" typeface="Microsoft Himalaya"/>
+        <a:font script="Thaa" typeface="MV Boli"/>
+        <a:font script="Deva" typeface="Mangal"/>
+        <a:font script="Telu" typeface="Gautami"/>
+        <a:font script="Taml" typeface="Latha"/>
+        <a:font script="Syrc" typeface="Estrangelo Edessa"/>
+        <a:font script="Orya" typeface="Kalinga"/>
+        <a:font script="Mlym" typeface="Kartika"/>
+        <a:font script="Laoo" typeface="DokChampa"/>
+        <a:font script="Sinh" typeface="Iskoola Pota"/>
+        <a:font script="Mong" typeface="Mongolian Baiti"/>
+        <a:font script="Viet" typeface="Times New Roman"/>
+        <a:font script="Uigh" typeface="Microsoft Uighur"/>
+        <a:font script="Geor" typeface="Sylfaen"/>
+      </a:majorFont>
+      <a:minorFont>
+        <a:latin typeface="Arial"/>
+        <a:ea typeface=""/>
+        <a:cs typeface=""/>
+        <a:font script="Jpan" typeface="ＭＳ Ｐゴシック"/>
+        <a:font script="Hang" typeface="맑은 고딕"/>
+        <a:font script="Hans" typeface="宋体"/>
+        <a:font script="Hant" typeface="新細明體"/>
+        <a:font script="Arab" typeface="Arial"/>
+        <a:font script="Hebr" typeface="Arial"/>
+        <a:font script="Thai" typeface="Cordia New"/>
+        <a:font script="Ethi" typeface="Nyala"/>
+        <a:font script="Beng" typeface="Vrinda"/>
+        <a:font script="Gujr" typeface="Shruti"/>
+        <a:font script="Khmr" typeface="DaunPenh"/>
+        <a:font script="Knda" typeface="Tunga"/>
+        <a:font script="Guru" typeface="Raavi"/>
+        <a:font script="Cans" typeface="Euphemia"/>
+        <a:font script="Cher" typeface="Plantagenet Cherokee"/>
+        <a:font script="Yiii" typeface="Microsoft Yi Baiti"/>
+        <a:font script="Tibt" typeface="Microsoft Himalaya"/>
+        <a:font script="Thaa" typeface="MV Boli"/>
+        <a:font script="Deva" typeface="Mangal"/>
+        <a:font script="Telu" typeface="Gautami"/>
+        <a:font script="Taml" typeface="Latha"/>
+        <a:font script="Syrc" typeface="Estrangelo Edessa"/>
+        <a:font script="Orya" typeface="Kalinga"/>
+        <a:font script="Mlym" typeface="Kartika"/>
+        <a:font script="Laoo" typeface="DokChampa"/>
+        <a:font script="Sinh" typeface="Iskoola Pota"/>
+        <a:font script="Mong" typeface="Mongolian Baiti"/>
+        <a:font script="Viet" typeface="Arial"/>
+        <a:font script="Uigh" typeface="Microsoft Uighur"/>
+        <a:font script="Geor" typeface="Sylfaen"/>
+      </a:minorFont>
+    </a:fontScheme>
+    <a:fmtScheme name="Office">
+      <a:fillStyleLst>
+        <a:solidFill>
+          <a:schemeClr val="phClr"/>
+        </a:solidFill>
+        <a:gradFill rotWithShape="1">
+          <a:gsLst>
+            <a:gs pos="0">
+              <a:schemeClr val="phClr">
+                <a:tint val="50000"/>
+                <a:satMod val="300000"/>
+              </a:schemeClr>
+            </a:gs>
+            <a:gs pos="35000">
+              <a:schemeClr val="phClr">
+                <a:tint val="37000"/>
+                <a:satMod val="300000"/>
+              </a:schemeClr>
+            </a:gs>
+            <a:gs pos="100000">
+              <a:schemeClr val="phClr">
+                <a:tint val="15000"/>
+                <a:satMod val="350000"/>
+              </a:schemeClr>
+            </a:gs>
+          </a:gsLst>
+          <a:lin ang="16200000" scaled="1"/>
+        </a:gradFill>
+        <a:gradFill rotWithShape="1">
+          <a:gsLst>
+            <a:gs pos="0">
+              <a:schemeClr val="phClr">
+                <a:tint val="100000"/>
+                <a:shade val="100000"/>
+                <a:satMod val="130000"/>
+              </a:schemeClr>
+            </a:gs>
+            <a:gs pos="100000">
+              <a:schemeClr val="phClr">
+                <a:tint val="50000"/>
+                <a:shade val="100000"/>
+                <a:satMod val="350000"/>
+              </a:schemeClr>
+            </a:gs>
+          </a:gsLst>
+          <a:lin ang="16200000" scaled="0"/>
+        </a:gradFill>
+      </a:fillStyleLst>
+      <a:lnStyleLst>
+        <a:ln w="9525" cap="flat" cmpd="sng" algn="ctr">
+          <a:solidFill>
+            <a:schemeClr val="phClr">
+              <a:shade val="95000"/>
+              <a:satMod val="105000"/>
+            </a:schemeClr>
+          </a:solidFill>
+          <a:prstDash val="solid"/>
+        </a:ln>
+        <a:ln w="25400" cap="flat" cmpd="sng" algn="ctr">
+          <a:solidFill>
+            <a:schemeClr val="phClr"/>
+          </a:solidFill>
+          <a:prstDash val="solid"/>
+        </a:ln>
+        <a:ln w="38100" cap="flat" cmpd="sng" algn="ctr">
+          <a:solidFill>
+            <a:schemeClr val="phClr"/>
+          </a:solidFill>
+          <a:prstDash val="solid"/>
+        </a:ln>
+      </a:lnStyleLst>
+      <a:effectStyleLst>
+        <a:effectStyle>
+          <a:effectLst>
+            <a:outerShdw blurRad="40000" dist="20000" dir="5400000" rotWithShape="0">
+              <a:srgbClr val="000000">
+                <a:alpha val="38000"/>
+              </a:srgbClr>
+            </a:outerShdw>
+          </a:effectLst>
+        </a:effectStyle>
+        <a:effectStyle>
+          <a:effectLst>
+            <a:outerShdw blurRad="40000" dist="23000" dir="5400000" rotWithShape="0">
+              <a:srgbClr val="000000">
+                <a:alpha val="35000"/>
+              </a:srgbClr>
+            </a:outerShdw>
+          </a:effectLst>
+        </a:effectStyle>
+        <a:effectStyle>
+          <a:effectLst>
+            <a:outerShdw blurRad="40000" dist="23000" dir="5400000" rotWithShape="0">
+              <a:srgbClr val="000000">
+                <a:alpha val="35000"/>
+              </a:srgbClr>
+            </a:outerShdw>
+          </a:effectLst>
+          <a:scene3d>
+            <a:camera prst="orthographicFront">
+              <a:rot lat="0" lon="0" rev="0"/>
+            </a:camera>
+            <a:lightRig rig="threePt" dir="t">
+              <a:rot lat="0" lon="0" rev="1200000"/>
+            </a:lightRig>
+          </a:scene3d>
+          <a:sp3d>
+            <a:bevelT w="63500" h="25400"/>
+          </a:sp3d>
+        </a:effectStyle>
+      </a:effectStyleLst>
+      <a:bgFillStyleLst>
+        <a:solidFill>
+          <a:schemeClr val="phClr"/>
+        </a:solidFill>
+        <a:gradFill rotWithShape="1">
+          <a:gsLst>
+            <a:gs pos="0">
+              <a:schemeClr val="phClr">
+                <a:tint val="40000"/>
+                <a:satMod val="350000"/>
+              </a:schemeClr>
+            </a:gs>
+            <a:gs pos="40000">
+              <a:schemeClr val="phClr">
+                <a:tint val="45000"/>
+                <a:shade val="99000"/>
+                <a:satMod val="350000"/>
+              </a:schemeClr>
+            </a:gs>
+            <a:gs pos="100000">
+              <a:schemeClr val="phClr">
+                <a:shade val="20000"/>
+                <a:satMod val="255000"/>
+              </a:schemeClr>
+            </a:gs>
+          </a:gsLst>
+          <a:path path="circle">
+            <a:fillToRect l="50000" t="-80000" r="50000" b="180000"/>
+          </a:path>
+        </a:gradFill>
+        <a:gradFill rotWithShape="1">
+          <a:gsLst>
+            <a:gs pos="0">
+              <a:schemeClr val="phClr">
+                <a:tint val="80000"/>
+                <a:satMod val="300000"/>
+              </a:schemeClr>
+            </a:gs>
+            <a:gs pos="100000">
+              <a:schemeClr val="phClr">
+                <a:shade val="30000"/>
+                <a:satMod val="200000"/>
+              </a:schemeClr>
+            </a:gs>
+          </a:gsLst>
+          <a:path path="circle">
+            <a:fillToRect l="50000" t="50000" r="50000" b="50000"/>
+          </a:path>
+        </a:gradFill>
+      </a:bgFillStyleLst>
+    </a:fmtScheme>
+  </a:themeElements>
+</a:theme>
+</file>
+
+<file path=ppt/theme/theme2.xml><?xml version="1.0" encoding="utf-8"?>
 <a:theme xmlns:a="http://schemas.openxmlformats.org/drawingml/2006/main" xmlns:r="http://schemas.openxmlformats.org/officeDocument/2006/relationships">
   <a:themeElements>
     <a:clrScheme name="Default">
@@ -8902,283 +10964,4 @@
     </a:fmtScheme>
   </a:themeElements>
 </a:theme>
-</file>
-
-<file path=ppt/theme/theme2.xml><?xml version="1.0" encoding="utf-8"?>
-<a:theme xmlns:a="http://schemas.openxmlformats.org/drawingml/2006/main" xmlns:r="http://schemas.openxmlformats.org/officeDocument/2006/relationships" name="Simple Light">
-  <a:themeElements>
-    <a:clrScheme name="Simple Light">
-      <a:dk1>
-        <a:srgbClr val="000000"/>
-      </a:dk1>
-      <a:lt1>
-        <a:srgbClr val="FFFFFF"/>
-      </a:lt1>
-      <a:dk2>
-        <a:srgbClr val="595959"/>
-      </a:dk2>
-      <a:lt2>
-        <a:srgbClr val="EEEEEE"/>
-      </a:lt2>
-      <a:accent1>
-        <a:srgbClr val="4285F4"/>
-      </a:accent1>
-      <a:accent2>
-        <a:srgbClr val="212121"/>
-      </a:accent2>
-      <a:accent3>
-        <a:srgbClr val="78909C"/>
-      </a:accent3>
-      <a:accent4>
-        <a:srgbClr val="FFAB40"/>
-      </a:accent4>
-      <a:accent5>
-        <a:srgbClr val="0097A7"/>
-      </a:accent5>
-      <a:accent6>
-        <a:srgbClr val="EEFF41"/>
-      </a:accent6>
-      <a:hlink>
-        <a:srgbClr val="0097A7"/>
-      </a:hlink>
-      <a:folHlink>
-        <a:srgbClr val="0097A7"/>
-      </a:folHlink>
-    </a:clrScheme>
-    <a:fontScheme name="Office">
-      <a:majorFont>
-        <a:latin typeface="Arial"/>
-        <a:ea typeface=""/>
-        <a:cs typeface=""/>
-        <a:font script="Jpan" typeface="ＭＳ Ｐゴシック"/>
-        <a:font script="Hang" typeface="맑은 고딕"/>
-        <a:font script="Hans" typeface="宋体"/>
-        <a:font script="Hant" typeface="新細明體"/>
-        <a:font script="Arab" typeface="Times New Roman"/>
-        <a:font script="Hebr" typeface="Times New Roman"/>
-        <a:font script="Thai" typeface="Angsana New"/>
-        <a:font script="Ethi" typeface="Nyala"/>
-        <a:font script="Beng" typeface="Vrinda"/>
-        <a:font script="Gujr" typeface="Shruti"/>
-        <a:font script="Khmr" typeface="MoolBoran"/>
-        <a:font script="Knda" typeface="Tunga"/>
-        <a:font script="Guru" typeface="Raavi"/>
-        <a:font script="Cans" typeface="Euphemia"/>
-        <a:font script="Cher" typeface="Plantagenet Cherokee"/>
-        <a:font script="Yiii" typeface="Microsoft Yi Baiti"/>
-        <a:font script="Tibt" typeface="Microsoft Himalaya"/>
-        <a:font script="Thaa" typeface="MV Boli"/>
-        <a:font script="Deva" typeface="Mangal"/>
-        <a:font script="Telu" typeface="Gautami"/>
-        <a:font script="Taml" typeface="Latha"/>
-        <a:font script="Syrc" typeface="Estrangelo Edessa"/>
-        <a:font script="Orya" typeface="Kalinga"/>
-        <a:font script="Mlym" typeface="Kartika"/>
-        <a:font script="Laoo" typeface="DokChampa"/>
-        <a:font script="Sinh" typeface="Iskoola Pota"/>
-        <a:font script="Mong" typeface="Mongolian Baiti"/>
-        <a:font script="Viet" typeface="Times New Roman"/>
-        <a:font script="Uigh" typeface="Microsoft Uighur"/>
-        <a:font script="Geor" typeface="Sylfaen"/>
-      </a:majorFont>
-      <a:minorFont>
-        <a:latin typeface="Arial"/>
-        <a:ea typeface=""/>
-        <a:cs typeface=""/>
-        <a:font script="Jpan" typeface="ＭＳ Ｐゴシック"/>
-        <a:font script="Hang" typeface="맑은 고딕"/>
-        <a:font script="Hans" typeface="宋体"/>
-        <a:font script="Hant" typeface="新細明體"/>
-        <a:font script="Arab" typeface="Arial"/>
-        <a:font script="Hebr" typeface="Arial"/>
-        <a:font script="Thai" typeface="Cordia New"/>
-        <a:font script="Ethi" typeface="Nyala"/>
-        <a:font script="Beng" typeface="Vrinda"/>
-        <a:font script="Gujr" typeface="Shruti"/>
-        <a:font script="Khmr" typeface="DaunPenh"/>
-        <a:font script="Knda" typeface="Tunga"/>
-        <a:font script="Guru" typeface="Raavi"/>
-        <a:font script="Cans" typeface="Euphemia"/>
-        <a:font script="Cher" typeface="Plantagenet Cherokee"/>
-        <a:font script="Yiii" typeface="Microsoft Yi Baiti"/>
-        <a:font script="Tibt" typeface="Microsoft Himalaya"/>
-        <a:font script="Thaa" typeface="MV Boli"/>
-        <a:font script="Deva" typeface="Mangal"/>
-        <a:font script="Telu" typeface="Gautami"/>
-        <a:font script="Taml" typeface="Latha"/>
-        <a:font script="Syrc" typeface="Estrangelo Edessa"/>
-        <a:font script="Orya" typeface="Kalinga"/>
-        <a:font script="Mlym" typeface="Kartika"/>
-        <a:font script="Laoo" typeface="DokChampa"/>
-        <a:font script="Sinh" typeface="Iskoola Pota"/>
-        <a:font script="Mong" typeface="Mongolian Baiti"/>
-        <a:font script="Viet" typeface="Arial"/>
-        <a:font script="Uigh" typeface="Microsoft Uighur"/>
-        <a:font script="Geor" typeface="Sylfaen"/>
-      </a:minorFont>
-    </a:fontScheme>
-    <a:fmtScheme name="Office">
-      <a:fillStyleLst>
-        <a:solidFill>
-          <a:schemeClr val="phClr"/>
-        </a:solidFill>
-        <a:gradFill rotWithShape="1">
-          <a:gsLst>
-            <a:gs pos="0">
-              <a:schemeClr val="phClr">
-                <a:tint val="50000"/>
-                <a:satMod val="300000"/>
-              </a:schemeClr>
-            </a:gs>
-            <a:gs pos="35000">
-              <a:schemeClr val="phClr">
-                <a:tint val="37000"/>
-                <a:satMod val="300000"/>
-              </a:schemeClr>
-            </a:gs>
-            <a:gs pos="100000">
-              <a:schemeClr val="phClr">
-                <a:tint val="15000"/>
-                <a:satMod val="350000"/>
-              </a:schemeClr>
-            </a:gs>
-          </a:gsLst>
-          <a:lin ang="16200000" scaled="1"/>
-        </a:gradFill>
-        <a:gradFill rotWithShape="1">
-          <a:gsLst>
-            <a:gs pos="0">
-              <a:schemeClr val="phClr">
-                <a:tint val="100000"/>
-                <a:shade val="100000"/>
-                <a:satMod val="130000"/>
-              </a:schemeClr>
-            </a:gs>
-            <a:gs pos="100000">
-              <a:schemeClr val="phClr">
-                <a:tint val="50000"/>
-                <a:shade val="100000"/>
-                <a:satMod val="350000"/>
-              </a:schemeClr>
-            </a:gs>
-          </a:gsLst>
-          <a:lin ang="16200000" scaled="0"/>
-        </a:gradFill>
-      </a:fillStyleLst>
-      <a:lnStyleLst>
-        <a:ln w="9525" cap="flat" cmpd="sng" algn="ctr">
-          <a:solidFill>
-            <a:schemeClr val="phClr">
-              <a:shade val="95000"/>
-              <a:satMod val="105000"/>
-            </a:schemeClr>
-          </a:solidFill>
-          <a:prstDash val="solid"/>
-        </a:ln>
-        <a:ln w="25400" cap="flat" cmpd="sng" algn="ctr">
-          <a:solidFill>
-            <a:schemeClr val="phClr"/>
-          </a:solidFill>
-          <a:prstDash val="solid"/>
-        </a:ln>
-        <a:ln w="38100" cap="flat" cmpd="sng" algn="ctr">
-          <a:solidFill>
-            <a:schemeClr val="phClr"/>
-          </a:solidFill>
-          <a:prstDash val="solid"/>
-        </a:ln>
-      </a:lnStyleLst>
-      <a:effectStyleLst>
-        <a:effectStyle>
-          <a:effectLst>
-            <a:outerShdw blurRad="40000" dist="20000" dir="5400000" rotWithShape="0">
-              <a:srgbClr val="000000">
-                <a:alpha val="38000"/>
-              </a:srgbClr>
-            </a:outerShdw>
-          </a:effectLst>
-        </a:effectStyle>
-        <a:effectStyle>
-          <a:effectLst>
-            <a:outerShdw blurRad="40000" dist="23000" dir="5400000" rotWithShape="0">
-              <a:srgbClr val="000000">
-                <a:alpha val="35000"/>
-              </a:srgbClr>
-            </a:outerShdw>
-          </a:effectLst>
-        </a:effectStyle>
-        <a:effectStyle>
-          <a:effectLst>
-            <a:outerShdw blurRad="40000" dist="23000" dir="5400000" rotWithShape="0">
-              <a:srgbClr val="000000">
-                <a:alpha val="35000"/>
-              </a:srgbClr>
-            </a:outerShdw>
-          </a:effectLst>
-          <a:scene3d>
-            <a:camera prst="orthographicFront">
-              <a:rot lat="0" lon="0" rev="0"/>
-            </a:camera>
-            <a:lightRig rig="threePt" dir="t">
-              <a:rot lat="0" lon="0" rev="1200000"/>
-            </a:lightRig>
-          </a:scene3d>
-          <a:sp3d>
-            <a:bevelT w="63500" h="25400"/>
-          </a:sp3d>
-        </a:effectStyle>
-      </a:effectStyleLst>
-      <a:bgFillStyleLst>
-        <a:solidFill>
-          <a:schemeClr val="phClr"/>
-        </a:solidFill>
-        <a:gradFill rotWithShape="1">
-          <a:gsLst>
-            <a:gs pos="0">
-              <a:schemeClr val="phClr">
-                <a:tint val="40000"/>
-                <a:satMod val="350000"/>
-              </a:schemeClr>
-            </a:gs>
-            <a:gs pos="40000">
-              <a:schemeClr val="phClr">
-                <a:tint val="45000"/>
-                <a:shade val="99000"/>
-                <a:satMod val="350000"/>
-              </a:schemeClr>
-            </a:gs>
-            <a:gs pos="100000">
-              <a:schemeClr val="phClr">
-                <a:shade val="20000"/>
-                <a:satMod val="255000"/>
-              </a:schemeClr>
-            </a:gs>
-          </a:gsLst>
-          <a:path path="circle">
-            <a:fillToRect l="50000" t="-80000" r="50000" b="180000"/>
-          </a:path>
-        </a:gradFill>
-        <a:gradFill rotWithShape="1">
-          <a:gsLst>
-            <a:gs pos="0">
-              <a:schemeClr val="phClr">
-                <a:tint val="80000"/>
-                <a:satMod val="300000"/>
-              </a:schemeClr>
-            </a:gs>
-            <a:gs pos="100000">
-              <a:schemeClr val="phClr">
-                <a:shade val="30000"/>
-                <a:satMod val="200000"/>
-              </a:schemeClr>
-            </a:gs>
-          </a:gsLst>
-          <a:path path="circle">
-            <a:fillToRect l="50000" t="50000" r="50000" b="50000"/>
-          </a:path>
-        </a:gradFill>
-      </a:bgFillStyleLst>
-    </a:fmtScheme>
-  </a:themeElements>
-</a:theme>
 </file>
</xml_diff>